<commit_message>
update make resource file.
素材作成用のパワポ更新。
</commit_message>
<xml_diff>
--- a/resource.pptx
+++ b/resource.pptx
@@ -10295,41 +10295,6 @@
           </p:txBody>
         </p:sp>
       </p:grpSp>
-      <p:sp>
-        <p:nvSpPr>
-          <p:cNvPr id="32" name="テキスト ボックス 31">
-            <a:extLst>
-              <a:ext uri="{FF2B5EF4-FFF2-40B4-BE49-F238E27FC236}">
-                <a16:creationId xmlns:a16="http://schemas.microsoft.com/office/drawing/2014/main" id="{6F6AC6C1-11EA-4776-99B3-AC311DF53860}"/>
-              </a:ext>
-            </a:extLst>
-          </p:cNvPr>
-          <p:cNvSpPr txBox="1"/>
-          <p:nvPr/>
-        </p:nvSpPr>
-        <p:spPr>
-          <a:xfrm>
-            <a:off x="4638675" y="1223174"/>
-            <a:ext cx="1647825" cy="369332"/>
-          </a:xfrm>
-          <a:prstGeom prst="rect">
-            <a:avLst/>
-          </a:prstGeom>
-          <a:noFill/>
-        </p:spPr>
-        <p:txBody>
-          <a:bodyPr wrap="square" rtlCol="0">
-            <a:spAutoFit/>
-          </a:bodyPr>
-          <a:lstStyle/>
-          <a:p>
-            <a:r>
-              <a:rPr kumimoji="1" lang="en-US" altLang="ja-JP" dirty="0"/>
-              <a:t>C</a:t>
-            </a:r>
-          </a:p>
-        </p:txBody>
-      </p:sp>
       <p:pic>
         <p:nvPicPr>
           <p:cNvPr id="34" name="図 33">
@@ -10358,7 +10323,7 @@
         </p:blipFill>
         <p:spPr>
           <a:xfrm>
-            <a:off x="3848100" y="2579132"/>
+            <a:off x="1457325" y="2398157"/>
             <a:ext cx="2438400" cy="2438400"/>
           </a:xfrm>
           <a:prstGeom prst="rect">
@@ -10380,7 +10345,7 @@
         </p:nvSpPr>
         <p:spPr>
           <a:xfrm>
-            <a:off x="7528560" y="1943100"/>
+            <a:off x="6240222" y="402228"/>
             <a:ext cx="1432560" cy="1432560"/>
           </a:xfrm>
           <a:prstGeom prst="ellipse">
@@ -10434,6 +10399,234 @@
           </a:p>
         </p:txBody>
       </p:sp>
+      <p:sp>
+        <p:nvSpPr>
+          <p:cNvPr id="2" name="楕円 1">
+            <a:extLst>
+              <a:ext uri="{FF2B5EF4-FFF2-40B4-BE49-F238E27FC236}">
+                <a16:creationId xmlns:a16="http://schemas.microsoft.com/office/drawing/2014/main" id="{AEE721C7-6276-4357-BB9A-30B1F5070712}"/>
+              </a:ext>
+            </a:extLst>
+          </p:cNvPr>
+          <p:cNvSpPr/>
+          <p:nvPr/>
+        </p:nvSpPr>
+        <p:spPr>
+          <a:xfrm>
+            <a:off x="8251923" y="3603131"/>
+            <a:ext cx="161449" cy="161449"/>
+          </a:xfrm>
+          <a:prstGeom prst="ellipse">
+            <a:avLst/>
+          </a:prstGeom>
+          <a:noFill/>
+          <a:ln w="12700">
+            <a:solidFill>
+              <a:schemeClr val="tx1"/>
+            </a:solidFill>
+          </a:ln>
+        </p:spPr>
+        <p:style>
+          <a:lnRef idx="2">
+            <a:schemeClr val="accent1">
+              <a:shade val="50000"/>
+            </a:schemeClr>
+          </a:lnRef>
+          <a:fillRef idx="1">
+            <a:schemeClr val="accent1"/>
+          </a:fillRef>
+          <a:effectRef idx="0">
+            <a:schemeClr val="accent1"/>
+          </a:effectRef>
+          <a:fontRef idx="minor">
+            <a:schemeClr val="lt1"/>
+          </a:fontRef>
+        </p:style>
+        <p:txBody>
+          <a:bodyPr rtlCol="0" anchor="ctr"/>
+          <a:lstStyle/>
+          <a:p>
+            <a:pPr algn="ctr"/>
+            <a:endParaRPr kumimoji="1" lang="ja-JP" altLang="en-US"/>
+          </a:p>
+        </p:txBody>
+      </p:sp>
+      <p:sp>
+        <p:nvSpPr>
+          <p:cNvPr id="4" name="楕円 3">
+            <a:extLst>
+              <a:ext uri="{FF2B5EF4-FFF2-40B4-BE49-F238E27FC236}">
+                <a16:creationId xmlns:a16="http://schemas.microsoft.com/office/drawing/2014/main" id="{4B4C83FA-8766-49CC-BDEB-CFE41AEAF06F}"/>
+              </a:ext>
+            </a:extLst>
+          </p:cNvPr>
+          <p:cNvSpPr/>
+          <p:nvPr/>
+        </p:nvSpPr>
+        <p:spPr>
+          <a:xfrm>
+            <a:off x="8662154" y="3658973"/>
+            <a:ext cx="101480" cy="101480"/>
+          </a:xfrm>
+          <a:prstGeom prst="ellipse">
+            <a:avLst/>
+          </a:prstGeom>
+          <a:solidFill>
+            <a:schemeClr val="tx1"/>
+          </a:solidFill>
+          <a:ln>
+            <a:noFill/>
+          </a:ln>
+        </p:spPr>
+        <p:style>
+          <a:lnRef idx="2">
+            <a:schemeClr val="accent1">
+              <a:shade val="50000"/>
+            </a:schemeClr>
+          </a:lnRef>
+          <a:fillRef idx="1">
+            <a:schemeClr val="accent1"/>
+          </a:fillRef>
+          <a:effectRef idx="0">
+            <a:schemeClr val="accent1"/>
+          </a:effectRef>
+          <a:fontRef idx="minor">
+            <a:schemeClr val="lt1"/>
+          </a:fontRef>
+        </p:style>
+        <p:txBody>
+          <a:bodyPr rtlCol="0" anchor="ctr"/>
+          <a:lstStyle/>
+          <a:p>
+            <a:pPr algn="ctr"/>
+            <a:endParaRPr kumimoji="1" lang="ja-JP" altLang="en-US"/>
+          </a:p>
+        </p:txBody>
+      </p:sp>
+      <p:sp>
+        <p:nvSpPr>
+          <p:cNvPr id="14" name="楕円 13">
+            <a:extLst>
+              <a:ext uri="{FF2B5EF4-FFF2-40B4-BE49-F238E27FC236}">
+                <a16:creationId xmlns:a16="http://schemas.microsoft.com/office/drawing/2014/main" id="{57F876FF-CE34-4C82-AD2F-70FB832514AD}"/>
+              </a:ext>
+            </a:extLst>
+          </p:cNvPr>
+          <p:cNvSpPr/>
+          <p:nvPr/>
+        </p:nvSpPr>
+        <p:spPr>
+          <a:xfrm>
+            <a:off x="8251923" y="4648198"/>
+            <a:ext cx="130413" cy="130413"/>
+          </a:xfrm>
+          <a:prstGeom prst="ellipse">
+            <a:avLst/>
+          </a:prstGeom>
+          <a:noFill/>
+          <a:ln>
+            <a:solidFill>
+              <a:schemeClr val="tx1"/>
+            </a:solidFill>
+          </a:ln>
+        </p:spPr>
+        <p:style>
+          <a:lnRef idx="2">
+            <a:schemeClr val="accent1">
+              <a:shade val="50000"/>
+            </a:schemeClr>
+          </a:lnRef>
+          <a:fillRef idx="1">
+            <a:schemeClr val="accent1"/>
+          </a:fillRef>
+          <a:effectRef idx="0">
+            <a:schemeClr val="accent1"/>
+          </a:effectRef>
+          <a:fontRef idx="minor">
+            <a:schemeClr val="lt1"/>
+          </a:fontRef>
+        </p:style>
+        <p:txBody>
+          <a:bodyPr rtlCol="0" anchor="ctr"/>
+          <a:lstStyle/>
+          <a:p>
+            <a:pPr algn="ctr"/>
+            <a:endParaRPr kumimoji="1" lang="ja-JP" altLang="en-US"/>
+          </a:p>
+        </p:txBody>
+      </p:sp>
+      <p:pic>
+        <p:nvPicPr>
+          <p:cNvPr id="7" name="図 6">
+            <a:extLst>
+              <a:ext uri="{FF2B5EF4-FFF2-40B4-BE49-F238E27FC236}">
+                <a16:creationId xmlns:a16="http://schemas.microsoft.com/office/drawing/2014/main" id="{827F1888-13EB-4510-B898-4F9C7719A33B}"/>
+              </a:ext>
+            </a:extLst>
+          </p:cNvPr>
+          <p:cNvPicPr>
+            <a:picLocks noChangeAspect="1"/>
+          </p:cNvPicPr>
+          <p:nvPr/>
+        </p:nvPicPr>
+        <p:blipFill>
+          <a:blip r:embed="rId3">
+            <a:extLst>
+              <a:ext uri="{28A0092B-C50C-407E-A947-70E740481C1C}">
+                <a14:useLocalDpi xmlns:a14="http://schemas.microsoft.com/office/drawing/2010/main" val="0"/>
+              </a:ext>
+            </a:extLst>
+          </a:blip>
+          <a:stretch>
+            <a:fillRect/>
+          </a:stretch>
+        </p:blipFill>
+        <p:spPr>
+          <a:xfrm>
+            <a:off x="6044179" y="3377179"/>
+            <a:ext cx="103641" cy="103641"/>
+          </a:xfrm>
+          <a:prstGeom prst="rect">
+            <a:avLst/>
+          </a:prstGeom>
+        </p:spPr>
+      </p:pic>
+      <p:pic>
+        <p:nvPicPr>
+          <p:cNvPr id="9" name="図 8">
+            <a:extLst>
+              <a:ext uri="{FF2B5EF4-FFF2-40B4-BE49-F238E27FC236}">
+                <a16:creationId xmlns:a16="http://schemas.microsoft.com/office/drawing/2014/main" id="{7DDD264D-E336-4559-8CFA-E02758B12166}"/>
+              </a:ext>
+            </a:extLst>
+          </p:cNvPr>
+          <p:cNvPicPr>
+            <a:picLocks noChangeAspect="1"/>
+          </p:cNvPicPr>
+          <p:nvPr/>
+        </p:nvPicPr>
+        <p:blipFill>
+          <a:blip r:embed="rId4">
+            <a:extLst>
+              <a:ext uri="{28A0092B-C50C-407E-A947-70E740481C1C}">
+                <a14:useLocalDpi xmlns:a14="http://schemas.microsoft.com/office/drawing/2010/main" val="0"/>
+              </a:ext>
+            </a:extLst>
+          </a:blip>
+          <a:stretch>
+            <a:fillRect/>
+          </a:stretch>
+        </p:blipFill>
+        <p:spPr>
+          <a:xfrm>
+            <a:off x="6010648" y="3340600"/>
+            <a:ext cx="170703" cy="176799"/>
+          </a:xfrm>
+          <a:prstGeom prst="rect">
+            <a:avLst/>
+          </a:prstGeom>
+        </p:spPr>
+      </p:pic>
     </p:spTree>
     <p:extLst>
       <p:ext uri="{BB962C8B-B14F-4D97-AF65-F5344CB8AC3E}">

</xml_diff>

<commit_message>
update make reosurce file.
</commit_message>
<xml_diff>
--- a/resource.pptx
+++ b/resource.pptx
@@ -22,47 +22,48 @@
     <p:sldId id="305" r:id="rId16"/>
     <p:sldId id="297" r:id="rId17"/>
     <p:sldId id="298" r:id="rId18"/>
-    <p:sldId id="308" r:id="rId19"/>
-    <p:sldId id="307" r:id="rId20"/>
-    <p:sldId id="299" r:id="rId21"/>
-    <p:sldId id="300" r:id="rId22"/>
-    <p:sldId id="295" r:id="rId23"/>
-    <p:sldId id="306" r:id="rId24"/>
-    <p:sldId id="293" r:id="rId25"/>
-    <p:sldId id="291" r:id="rId26"/>
-    <p:sldId id="282" r:id="rId27"/>
-    <p:sldId id="283" r:id="rId28"/>
-    <p:sldId id="285" r:id="rId29"/>
-    <p:sldId id="290" r:id="rId30"/>
-    <p:sldId id="287" r:id="rId31"/>
-    <p:sldId id="289" r:id="rId32"/>
-    <p:sldId id="286" r:id="rId33"/>
-    <p:sldId id="292" r:id="rId34"/>
-    <p:sldId id="284" r:id="rId35"/>
-    <p:sldId id="281" r:id="rId36"/>
-    <p:sldId id="280" r:id="rId37"/>
-    <p:sldId id="279" r:id="rId38"/>
-    <p:sldId id="278" r:id="rId39"/>
-    <p:sldId id="277" r:id="rId40"/>
-    <p:sldId id="275" r:id="rId41"/>
-    <p:sldId id="276" r:id="rId42"/>
-    <p:sldId id="274" r:id="rId43"/>
-    <p:sldId id="273" r:id="rId44"/>
-    <p:sldId id="272" r:id="rId45"/>
-    <p:sldId id="271" r:id="rId46"/>
-    <p:sldId id="270" r:id="rId47"/>
-    <p:sldId id="265" r:id="rId48"/>
-    <p:sldId id="267" r:id="rId49"/>
-    <p:sldId id="269" r:id="rId50"/>
-    <p:sldId id="296" r:id="rId51"/>
-    <p:sldId id="268" r:id="rId52"/>
-    <p:sldId id="263" r:id="rId53"/>
-    <p:sldId id="264" r:id="rId54"/>
-    <p:sldId id="262" r:id="rId55"/>
-    <p:sldId id="261" r:id="rId56"/>
-    <p:sldId id="259" r:id="rId57"/>
-    <p:sldId id="313" r:id="rId58"/>
-    <p:sldId id="294" r:id="rId59"/>
+    <p:sldId id="314" r:id="rId19"/>
+    <p:sldId id="308" r:id="rId20"/>
+    <p:sldId id="307" r:id="rId21"/>
+    <p:sldId id="299" r:id="rId22"/>
+    <p:sldId id="300" r:id="rId23"/>
+    <p:sldId id="295" r:id="rId24"/>
+    <p:sldId id="306" r:id="rId25"/>
+    <p:sldId id="293" r:id="rId26"/>
+    <p:sldId id="291" r:id="rId27"/>
+    <p:sldId id="282" r:id="rId28"/>
+    <p:sldId id="283" r:id="rId29"/>
+    <p:sldId id="285" r:id="rId30"/>
+    <p:sldId id="290" r:id="rId31"/>
+    <p:sldId id="287" r:id="rId32"/>
+    <p:sldId id="289" r:id="rId33"/>
+    <p:sldId id="286" r:id="rId34"/>
+    <p:sldId id="292" r:id="rId35"/>
+    <p:sldId id="284" r:id="rId36"/>
+    <p:sldId id="281" r:id="rId37"/>
+    <p:sldId id="280" r:id="rId38"/>
+    <p:sldId id="279" r:id="rId39"/>
+    <p:sldId id="278" r:id="rId40"/>
+    <p:sldId id="277" r:id="rId41"/>
+    <p:sldId id="275" r:id="rId42"/>
+    <p:sldId id="276" r:id="rId43"/>
+    <p:sldId id="274" r:id="rId44"/>
+    <p:sldId id="273" r:id="rId45"/>
+    <p:sldId id="272" r:id="rId46"/>
+    <p:sldId id="271" r:id="rId47"/>
+    <p:sldId id="270" r:id="rId48"/>
+    <p:sldId id="265" r:id="rId49"/>
+    <p:sldId id="267" r:id="rId50"/>
+    <p:sldId id="269" r:id="rId51"/>
+    <p:sldId id="296" r:id="rId52"/>
+    <p:sldId id="268" r:id="rId53"/>
+    <p:sldId id="263" r:id="rId54"/>
+    <p:sldId id="264" r:id="rId55"/>
+    <p:sldId id="262" r:id="rId56"/>
+    <p:sldId id="261" r:id="rId57"/>
+    <p:sldId id="259" r:id="rId58"/>
+    <p:sldId id="313" r:id="rId59"/>
+    <p:sldId id="294" r:id="rId60"/>
   </p:sldIdLst>
   <p:sldSz cx="12192000" cy="6858000"/>
   <p:notesSz cx="6858000" cy="9144000"/>
@@ -326,7 +327,7 @@
           <a:p>
             <a:fld id="{F393CF75-DA3A-4376-8130-7D6E005E77C9}" type="datetimeFigureOut">
               <a:rPr kumimoji="1" lang="ja-JP" altLang="en-US" smtClean="0"/>
-              <a:t>2019/12/31</a:t>
+              <a:t>2020/1/2</a:t>
             </a:fld>
             <a:endParaRPr kumimoji="1" lang="ja-JP" altLang="en-US"/>
           </a:p>
@@ -528,7 +529,7 @@
           <a:p>
             <a:fld id="{F393CF75-DA3A-4376-8130-7D6E005E77C9}" type="datetimeFigureOut">
               <a:rPr kumimoji="1" lang="ja-JP" altLang="en-US" smtClean="0"/>
-              <a:t>2019/12/31</a:t>
+              <a:t>2020/1/2</a:t>
             </a:fld>
             <a:endParaRPr kumimoji="1" lang="ja-JP" altLang="en-US"/>
           </a:p>
@@ -740,7 +741,7 @@
           <a:p>
             <a:fld id="{F393CF75-DA3A-4376-8130-7D6E005E77C9}" type="datetimeFigureOut">
               <a:rPr kumimoji="1" lang="ja-JP" altLang="en-US" smtClean="0"/>
-              <a:t>2019/12/31</a:t>
+              <a:t>2020/1/2</a:t>
             </a:fld>
             <a:endParaRPr kumimoji="1" lang="ja-JP" altLang="en-US"/>
           </a:p>
@@ -942,7 +943,7 @@
           <a:p>
             <a:fld id="{F393CF75-DA3A-4376-8130-7D6E005E77C9}" type="datetimeFigureOut">
               <a:rPr kumimoji="1" lang="ja-JP" altLang="en-US" smtClean="0"/>
-              <a:t>2019/12/31</a:t>
+              <a:t>2020/1/2</a:t>
             </a:fld>
             <a:endParaRPr kumimoji="1" lang="ja-JP" altLang="en-US"/>
           </a:p>
@@ -1188,7 +1189,7 @@
           <a:p>
             <a:fld id="{F393CF75-DA3A-4376-8130-7D6E005E77C9}" type="datetimeFigureOut">
               <a:rPr kumimoji="1" lang="ja-JP" altLang="en-US" smtClean="0"/>
-              <a:t>2019/12/31</a:t>
+              <a:t>2020/1/2</a:t>
             </a:fld>
             <a:endParaRPr kumimoji="1" lang="ja-JP" altLang="en-US"/>
           </a:p>
@@ -1484,7 +1485,7 @@
           <a:p>
             <a:fld id="{F393CF75-DA3A-4376-8130-7D6E005E77C9}" type="datetimeFigureOut">
               <a:rPr kumimoji="1" lang="ja-JP" altLang="en-US" smtClean="0"/>
-              <a:t>2019/12/31</a:t>
+              <a:t>2020/1/2</a:t>
             </a:fld>
             <a:endParaRPr kumimoji="1" lang="ja-JP" altLang="en-US"/>
           </a:p>
@@ -1915,7 +1916,7 @@
           <a:p>
             <a:fld id="{F393CF75-DA3A-4376-8130-7D6E005E77C9}" type="datetimeFigureOut">
               <a:rPr kumimoji="1" lang="ja-JP" altLang="en-US" smtClean="0"/>
-              <a:t>2019/12/31</a:t>
+              <a:t>2020/1/2</a:t>
             </a:fld>
             <a:endParaRPr kumimoji="1" lang="ja-JP" altLang="en-US"/>
           </a:p>
@@ -2033,7 +2034,7 @@
           <a:p>
             <a:fld id="{F393CF75-DA3A-4376-8130-7D6E005E77C9}" type="datetimeFigureOut">
               <a:rPr kumimoji="1" lang="ja-JP" altLang="en-US" smtClean="0"/>
-              <a:t>2019/12/31</a:t>
+              <a:t>2020/1/2</a:t>
             </a:fld>
             <a:endParaRPr kumimoji="1" lang="ja-JP" altLang="en-US"/>
           </a:p>
@@ -2128,7 +2129,7 @@
           <a:p>
             <a:fld id="{F393CF75-DA3A-4376-8130-7D6E005E77C9}" type="datetimeFigureOut">
               <a:rPr kumimoji="1" lang="ja-JP" altLang="en-US" smtClean="0"/>
-              <a:t>2019/12/31</a:t>
+              <a:t>2020/1/2</a:t>
             </a:fld>
             <a:endParaRPr kumimoji="1" lang="ja-JP" altLang="en-US"/>
           </a:p>
@@ -2437,7 +2438,7 @@
           <a:p>
             <a:fld id="{F393CF75-DA3A-4376-8130-7D6E005E77C9}" type="datetimeFigureOut">
               <a:rPr kumimoji="1" lang="ja-JP" altLang="en-US" smtClean="0"/>
-              <a:t>2019/12/31</a:t>
+              <a:t>2020/1/2</a:t>
             </a:fld>
             <a:endParaRPr kumimoji="1" lang="ja-JP" altLang="en-US"/>
           </a:p>
@@ -2694,7 +2695,7 @@
           <a:p>
             <a:fld id="{F393CF75-DA3A-4376-8130-7D6E005E77C9}" type="datetimeFigureOut">
               <a:rPr kumimoji="1" lang="ja-JP" altLang="en-US" smtClean="0"/>
-              <a:t>2019/12/31</a:t>
+              <a:t>2020/1/2</a:t>
             </a:fld>
             <a:endParaRPr kumimoji="1" lang="ja-JP" altLang="en-US"/>
           </a:p>
@@ -2939,7 +2940,7 @@
           <a:p>
             <a:fld id="{F393CF75-DA3A-4376-8130-7D6E005E77C9}" type="datetimeFigureOut">
               <a:rPr kumimoji="1" lang="ja-JP" altLang="en-US" smtClean="0"/>
-              <a:t>2019/12/31</a:t>
+              <a:t>2020/1/2</a:t>
             </a:fld>
             <a:endParaRPr kumimoji="1" lang="ja-JP" altLang="en-US"/>
           </a:p>
@@ -11411,6 +11412,607 @@
     <p:bg>
       <p:bgPr>
         <a:solidFill>
+          <a:schemeClr val="tx1">
+            <a:lumMod val="85000"/>
+          </a:schemeClr>
+        </a:solidFill>
+        <a:effectLst/>
+      </p:bgPr>
+    </p:bg>
+    <p:spTree>
+      <p:nvGrpSpPr>
+        <p:cNvPr id="1" name=""/>
+        <p:cNvGrpSpPr/>
+        <p:nvPr/>
+      </p:nvGrpSpPr>
+      <p:grpSpPr>
+        <a:xfrm>
+          <a:off x="0" y="0"/>
+          <a:ext cx="0" cy="0"/>
+          <a:chOff x="0" y="0"/>
+          <a:chExt cx="0" cy="0"/>
+        </a:xfrm>
+      </p:grpSpPr>
+      <p:sp>
+        <p:nvSpPr>
+          <p:cNvPr id="2" name="四角形: 角を丸くする 1">
+            <a:extLst>
+              <a:ext uri="{FF2B5EF4-FFF2-40B4-BE49-F238E27FC236}">
+                <a16:creationId xmlns:a16="http://schemas.microsoft.com/office/drawing/2014/main" id="{F8405F3E-E41B-4817-A754-4396863E1DBF}"/>
+              </a:ext>
+            </a:extLst>
+          </p:cNvPr>
+          <p:cNvSpPr/>
+          <p:nvPr/>
+        </p:nvSpPr>
+        <p:spPr>
+          <a:xfrm>
+            <a:off x="5981700" y="209550"/>
+            <a:ext cx="5867400" cy="3343275"/>
+          </a:xfrm>
+          <a:prstGeom prst="roundRect">
+            <a:avLst>
+              <a:gd name="adj" fmla="val 2422"/>
+            </a:avLst>
+          </a:prstGeom>
+          <a:solidFill>
+            <a:schemeClr val="tx1"/>
+          </a:solidFill>
+          <a:ln>
+            <a:noFill/>
+          </a:ln>
+        </p:spPr>
+        <p:style>
+          <a:lnRef idx="2">
+            <a:schemeClr val="accent1">
+              <a:shade val="50000"/>
+            </a:schemeClr>
+          </a:lnRef>
+          <a:fillRef idx="1">
+            <a:schemeClr val="accent1"/>
+          </a:fillRef>
+          <a:effectRef idx="0">
+            <a:schemeClr val="accent1"/>
+          </a:effectRef>
+          <a:fontRef idx="minor">
+            <a:schemeClr val="lt1"/>
+          </a:fontRef>
+        </p:style>
+        <p:txBody>
+          <a:bodyPr rtlCol="0" anchor="ctr"/>
+          <a:lstStyle/>
+          <a:p>
+            <a:pPr algn="ctr"/>
+            <a:endParaRPr kumimoji="1" lang="ja-JP" altLang="en-US"/>
+          </a:p>
+        </p:txBody>
+      </p:sp>
+      <p:sp>
+        <p:nvSpPr>
+          <p:cNvPr id="3" name="テキスト ボックス 2">
+            <a:extLst>
+              <a:ext uri="{FF2B5EF4-FFF2-40B4-BE49-F238E27FC236}">
+                <a16:creationId xmlns:a16="http://schemas.microsoft.com/office/drawing/2014/main" id="{2E7D0F28-60F6-4A78-976B-84C1921B263A}"/>
+              </a:ext>
+            </a:extLst>
+          </p:cNvPr>
+          <p:cNvSpPr txBox="1"/>
+          <p:nvPr/>
+        </p:nvSpPr>
+        <p:spPr>
+          <a:xfrm>
+            <a:off x="6062662" y="1419522"/>
+            <a:ext cx="5705475" cy="923330"/>
+          </a:xfrm>
+          <a:prstGeom prst="rect">
+            <a:avLst/>
+          </a:prstGeom>
+          <a:noFill/>
+        </p:spPr>
+        <p:txBody>
+          <a:bodyPr wrap="square" rtlCol="0">
+            <a:spAutoFit/>
+          </a:bodyPr>
+          <a:lstStyle/>
+          <a:p>
+            <a:r>
+              <a:rPr kumimoji="1" lang="ja-JP" altLang="en-US" sz="5400" dirty="0">
+                <a:solidFill>
+                  <a:schemeClr val="bg1"/>
+                </a:solidFill>
+              </a:rPr>
+              <a:t>キャッシュクリア</a:t>
+            </a:r>
+          </a:p>
+        </p:txBody>
+      </p:sp>
+      <p:sp>
+        <p:nvSpPr>
+          <p:cNvPr id="5" name="正方形/長方形 4">
+            <a:extLst>
+              <a:ext uri="{FF2B5EF4-FFF2-40B4-BE49-F238E27FC236}">
+                <a16:creationId xmlns:a16="http://schemas.microsoft.com/office/drawing/2014/main" id="{6960556B-6D15-4DB0-8ABC-F27F5BAC7B98}"/>
+              </a:ext>
+            </a:extLst>
+          </p:cNvPr>
+          <p:cNvSpPr/>
+          <p:nvPr/>
+        </p:nvSpPr>
+        <p:spPr>
+          <a:xfrm rot="19711207">
+            <a:off x="1737586" y="790575"/>
+            <a:ext cx="114300" cy="1466850"/>
+          </a:xfrm>
+          <a:prstGeom prst="rect">
+            <a:avLst/>
+          </a:prstGeom>
+          <a:solidFill>
+            <a:schemeClr val="tx1"/>
+          </a:solidFill>
+          <a:ln>
+            <a:noFill/>
+          </a:ln>
+        </p:spPr>
+        <p:style>
+          <a:lnRef idx="2">
+            <a:schemeClr val="accent1">
+              <a:shade val="50000"/>
+            </a:schemeClr>
+          </a:lnRef>
+          <a:fillRef idx="1">
+            <a:schemeClr val="accent1"/>
+          </a:fillRef>
+          <a:effectRef idx="0">
+            <a:schemeClr val="accent1"/>
+          </a:effectRef>
+          <a:fontRef idx="minor">
+            <a:schemeClr val="lt1"/>
+          </a:fontRef>
+        </p:style>
+        <p:txBody>
+          <a:bodyPr rtlCol="0" anchor="ctr"/>
+          <a:lstStyle/>
+          <a:p>
+            <a:pPr algn="ctr"/>
+            <a:endParaRPr kumimoji="1" lang="ja-JP" altLang="en-US"/>
+          </a:p>
+        </p:txBody>
+      </p:sp>
+      <p:sp>
+        <p:nvSpPr>
+          <p:cNvPr id="46" name="正方形/長方形 45">
+            <a:extLst>
+              <a:ext uri="{FF2B5EF4-FFF2-40B4-BE49-F238E27FC236}">
+                <a16:creationId xmlns:a16="http://schemas.microsoft.com/office/drawing/2014/main" id="{C2CBE095-712F-44C1-8938-23AAEEDD4AE8}"/>
+              </a:ext>
+            </a:extLst>
+          </p:cNvPr>
+          <p:cNvSpPr/>
+          <p:nvPr/>
+        </p:nvSpPr>
+        <p:spPr>
+          <a:xfrm rot="20683958">
+            <a:off x="2471011" y="561974"/>
+            <a:ext cx="114300" cy="1466850"/>
+          </a:xfrm>
+          <a:prstGeom prst="rect">
+            <a:avLst/>
+          </a:prstGeom>
+          <a:solidFill>
+            <a:schemeClr val="tx1"/>
+          </a:solidFill>
+          <a:ln>
+            <a:noFill/>
+          </a:ln>
+        </p:spPr>
+        <p:style>
+          <a:lnRef idx="2">
+            <a:schemeClr val="accent1">
+              <a:shade val="50000"/>
+            </a:schemeClr>
+          </a:lnRef>
+          <a:fillRef idx="1">
+            <a:schemeClr val="accent1"/>
+          </a:fillRef>
+          <a:effectRef idx="0">
+            <a:schemeClr val="accent1"/>
+          </a:effectRef>
+          <a:fontRef idx="minor">
+            <a:schemeClr val="lt1"/>
+          </a:fontRef>
+        </p:style>
+        <p:txBody>
+          <a:bodyPr rtlCol="0" anchor="ctr"/>
+          <a:lstStyle/>
+          <a:p>
+            <a:pPr algn="ctr"/>
+            <a:endParaRPr kumimoji="1" lang="ja-JP" altLang="en-US"/>
+          </a:p>
+        </p:txBody>
+      </p:sp>
+      <p:sp>
+        <p:nvSpPr>
+          <p:cNvPr id="50" name="正方形/長方形 49">
+            <a:extLst>
+              <a:ext uri="{FF2B5EF4-FFF2-40B4-BE49-F238E27FC236}">
+                <a16:creationId xmlns:a16="http://schemas.microsoft.com/office/drawing/2014/main" id="{F2A7622D-6409-4856-AB65-D58CF2344643}"/>
+              </a:ext>
+            </a:extLst>
+          </p:cNvPr>
+          <p:cNvSpPr/>
+          <p:nvPr/>
+        </p:nvSpPr>
+        <p:spPr>
+          <a:xfrm rot="19739805">
+            <a:off x="2796106" y="2513875"/>
+            <a:ext cx="114300" cy="1466850"/>
+          </a:xfrm>
+          <a:prstGeom prst="rect">
+            <a:avLst/>
+          </a:prstGeom>
+          <a:solidFill>
+            <a:schemeClr val="tx1"/>
+          </a:solidFill>
+          <a:ln>
+            <a:noFill/>
+          </a:ln>
+        </p:spPr>
+        <p:style>
+          <a:lnRef idx="2">
+            <a:schemeClr val="accent1">
+              <a:shade val="50000"/>
+            </a:schemeClr>
+          </a:lnRef>
+          <a:fillRef idx="1">
+            <a:schemeClr val="accent1"/>
+          </a:fillRef>
+          <a:effectRef idx="0">
+            <a:schemeClr val="accent1"/>
+          </a:effectRef>
+          <a:fontRef idx="minor">
+            <a:schemeClr val="lt1"/>
+          </a:fontRef>
+        </p:style>
+        <p:txBody>
+          <a:bodyPr rtlCol="0" anchor="ctr"/>
+          <a:lstStyle/>
+          <a:p>
+            <a:pPr algn="ctr"/>
+            <a:endParaRPr kumimoji="1" lang="ja-JP" altLang="en-US"/>
+          </a:p>
+        </p:txBody>
+      </p:sp>
+      <p:sp>
+        <p:nvSpPr>
+          <p:cNvPr id="58" name="正方形/長方形 57">
+            <a:extLst>
+              <a:ext uri="{FF2B5EF4-FFF2-40B4-BE49-F238E27FC236}">
+                <a16:creationId xmlns:a16="http://schemas.microsoft.com/office/drawing/2014/main" id="{82E85BFB-A53F-4092-AC9B-652A9A13D9D6}"/>
+              </a:ext>
+            </a:extLst>
+          </p:cNvPr>
+          <p:cNvSpPr/>
+          <p:nvPr/>
+        </p:nvSpPr>
+        <p:spPr>
+          <a:xfrm>
+            <a:off x="3703777" y="2085975"/>
+            <a:ext cx="114300" cy="1466850"/>
+          </a:xfrm>
+          <a:prstGeom prst="rect">
+            <a:avLst/>
+          </a:prstGeom>
+          <a:solidFill>
+            <a:schemeClr val="tx1"/>
+          </a:solidFill>
+          <a:ln>
+            <a:noFill/>
+          </a:ln>
+        </p:spPr>
+        <p:style>
+          <a:lnRef idx="2">
+            <a:schemeClr val="accent1">
+              <a:shade val="50000"/>
+            </a:schemeClr>
+          </a:lnRef>
+          <a:fillRef idx="1">
+            <a:schemeClr val="accent1"/>
+          </a:fillRef>
+          <a:effectRef idx="0">
+            <a:schemeClr val="accent1"/>
+          </a:effectRef>
+          <a:fontRef idx="minor">
+            <a:schemeClr val="lt1"/>
+          </a:fontRef>
+        </p:style>
+        <p:txBody>
+          <a:bodyPr rtlCol="0" anchor="ctr"/>
+          <a:lstStyle/>
+          <a:p>
+            <a:pPr algn="ctr"/>
+            <a:endParaRPr kumimoji="1" lang="ja-JP" altLang="en-US"/>
+          </a:p>
+        </p:txBody>
+      </p:sp>
+      <p:sp>
+        <p:nvSpPr>
+          <p:cNvPr id="70" name="正方形/長方形 69">
+            <a:extLst>
+              <a:ext uri="{FF2B5EF4-FFF2-40B4-BE49-F238E27FC236}">
+                <a16:creationId xmlns:a16="http://schemas.microsoft.com/office/drawing/2014/main" id="{5EC6DA8D-C60C-4F87-AA8F-71D902C5125F}"/>
+              </a:ext>
+            </a:extLst>
+          </p:cNvPr>
+          <p:cNvSpPr/>
+          <p:nvPr/>
+        </p:nvSpPr>
+        <p:spPr>
+          <a:xfrm rot="5400000">
+            <a:off x="5272087" y="3667125"/>
+            <a:ext cx="114300" cy="1466850"/>
+          </a:xfrm>
+          <a:prstGeom prst="rect">
+            <a:avLst/>
+          </a:prstGeom>
+          <a:solidFill>
+            <a:schemeClr val="tx1"/>
+          </a:solidFill>
+          <a:ln>
+            <a:noFill/>
+          </a:ln>
+        </p:spPr>
+        <p:style>
+          <a:lnRef idx="2">
+            <a:schemeClr val="accent1">
+              <a:shade val="50000"/>
+            </a:schemeClr>
+          </a:lnRef>
+          <a:fillRef idx="1">
+            <a:schemeClr val="accent1"/>
+          </a:fillRef>
+          <a:effectRef idx="0">
+            <a:schemeClr val="accent1"/>
+          </a:effectRef>
+          <a:fontRef idx="minor">
+            <a:schemeClr val="lt1"/>
+          </a:fontRef>
+        </p:style>
+        <p:txBody>
+          <a:bodyPr rtlCol="0" anchor="ctr"/>
+          <a:lstStyle/>
+          <a:p>
+            <a:pPr algn="ctr"/>
+            <a:endParaRPr kumimoji="1" lang="ja-JP" altLang="en-US"/>
+          </a:p>
+        </p:txBody>
+      </p:sp>
+      <p:sp>
+        <p:nvSpPr>
+          <p:cNvPr id="71" name="正方形/長方形 70">
+            <a:extLst>
+              <a:ext uri="{FF2B5EF4-FFF2-40B4-BE49-F238E27FC236}">
+                <a16:creationId xmlns:a16="http://schemas.microsoft.com/office/drawing/2014/main" id="{D8354B33-4A2D-4E5C-BD5B-B66DAFE006DB}"/>
+              </a:ext>
+            </a:extLst>
+          </p:cNvPr>
+          <p:cNvSpPr/>
+          <p:nvPr/>
+        </p:nvSpPr>
+        <p:spPr>
+          <a:xfrm rot="5400000">
+            <a:off x="2169318" y="3658597"/>
+            <a:ext cx="114300" cy="1466850"/>
+          </a:xfrm>
+          <a:prstGeom prst="rect">
+            <a:avLst/>
+          </a:prstGeom>
+          <a:solidFill>
+            <a:schemeClr val="tx1"/>
+          </a:solidFill>
+          <a:ln>
+            <a:noFill/>
+          </a:ln>
+        </p:spPr>
+        <p:style>
+          <a:lnRef idx="2">
+            <a:schemeClr val="accent1">
+              <a:shade val="50000"/>
+            </a:schemeClr>
+          </a:lnRef>
+          <a:fillRef idx="1">
+            <a:schemeClr val="accent1"/>
+          </a:fillRef>
+          <a:effectRef idx="0">
+            <a:schemeClr val="accent1"/>
+          </a:effectRef>
+          <a:fontRef idx="minor">
+            <a:schemeClr val="lt1"/>
+          </a:fontRef>
+        </p:style>
+        <p:txBody>
+          <a:bodyPr rtlCol="0" anchor="ctr"/>
+          <a:lstStyle/>
+          <a:p>
+            <a:pPr algn="ctr"/>
+            <a:endParaRPr kumimoji="1" lang="ja-JP" altLang="en-US"/>
+          </a:p>
+        </p:txBody>
+      </p:sp>
+      <p:sp>
+        <p:nvSpPr>
+          <p:cNvPr id="72" name="正方形/長方形 71">
+            <a:extLst>
+              <a:ext uri="{FF2B5EF4-FFF2-40B4-BE49-F238E27FC236}">
+                <a16:creationId xmlns:a16="http://schemas.microsoft.com/office/drawing/2014/main" id="{BA3CB06C-825C-4DEC-B47A-54C751D96DD8}"/>
+              </a:ext>
+            </a:extLst>
+          </p:cNvPr>
+          <p:cNvSpPr/>
+          <p:nvPr/>
+        </p:nvSpPr>
+        <p:spPr>
+          <a:xfrm rot="4500000">
+            <a:off x="7208044" y="5355160"/>
+            <a:ext cx="114300" cy="1466850"/>
+          </a:xfrm>
+          <a:prstGeom prst="rect">
+            <a:avLst/>
+          </a:prstGeom>
+          <a:solidFill>
+            <a:schemeClr val="tx1"/>
+          </a:solidFill>
+          <a:ln>
+            <a:noFill/>
+          </a:ln>
+        </p:spPr>
+        <p:style>
+          <a:lnRef idx="2">
+            <a:schemeClr val="accent1">
+              <a:shade val="50000"/>
+            </a:schemeClr>
+          </a:lnRef>
+          <a:fillRef idx="1">
+            <a:schemeClr val="accent1"/>
+          </a:fillRef>
+          <a:effectRef idx="0">
+            <a:schemeClr val="accent1"/>
+          </a:effectRef>
+          <a:fontRef idx="minor">
+            <a:schemeClr val="lt1"/>
+          </a:fontRef>
+        </p:style>
+        <p:txBody>
+          <a:bodyPr rtlCol="0" anchor="ctr"/>
+          <a:lstStyle/>
+          <a:p>
+            <a:pPr algn="ctr"/>
+            <a:endParaRPr kumimoji="1" lang="ja-JP" altLang="en-US"/>
+          </a:p>
+        </p:txBody>
+      </p:sp>
+      <p:sp>
+        <p:nvSpPr>
+          <p:cNvPr id="73" name="正方形/長方形 72">
+            <a:extLst>
+              <a:ext uri="{FF2B5EF4-FFF2-40B4-BE49-F238E27FC236}">
+                <a16:creationId xmlns:a16="http://schemas.microsoft.com/office/drawing/2014/main" id="{66CAEBC2-85AB-42FE-BEA7-16EAEB31696E}"/>
+              </a:ext>
+            </a:extLst>
+          </p:cNvPr>
+          <p:cNvSpPr/>
+          <p:nvPr/>
+        </p:nvSpPr>
+        <p:spPr>
+          <a:xfrm>
+            <a:off x="3664229" y="5427352"/>
+            <a:ext cx="114300" cy="1466850"/>
+          </a:xfrm>
+          <a:prstGeom prst="rect">
+            <a:avLst/>
+          </a:prstGeom>
+          <a:solidFill>
+            <a:schemeClr val="tx1"/>
+          </a:solidFill>
+          <a:ln>
+            <a:noFill/>
+          </a:ln>
+        </p:spPr>
+        <p:style>
+          <a:lnRef idx="2">
+            <a:schemeClr val="accent1">
+              <a:shade val="50000"/>
+            </a:schemeClr>
+          </a:lnRef>
+          <a:fillRef idx="1">
+            <a:schemeClr val="accent1"/>
+          </a:fillRef>
+          <a:effectRef idx="0">
+            <a:schemeClr val="accent1"/>
+          </a:effectRef>
+          <a:fontRef idx="minor">
+            <a:schemeClr val="lt1"/>
+          </a:fontRef>
+        </p:style>
+        <p:txBody>
+          <a:bodyPr rtlCol="0" anchor="ctr"/>
+          <a:lstStyle/>
+          <a:p>
+            <a:pPr algn="ctr"/>
+            <a:endParaRPr kumimoji="1" lang="ja-JP" altLang="en-US"/>
+          </a:p>
+        </p:txBody>
+      </p:sp>
+      <p:sp>
+        <p:nvSpPr>
+          <p:cNvPr id="74" name="正方形/長方形 73">
+            <a:extLst>
+              <a:ext uri="{FF2B5EF4-FFF2-40B4-BE49-F238E27FC236}">
+                <a16:creationId xmlns:a16="http://schemas.microsoft.com/office/drawing/2014/main" id="{1695AA6C-9E4A-4F4E-B352-38273D1F15EA}"/>
+              </a:ext>
+            </a:extLst>
+          </p:cNvPr>
+          <p:cNvSpPr/>
+          <p:nvPr/>
+        </p:nvSpPr>
+        <p:spPr>
+          <a:xfrm rot="3600000">
+            <a:off x="2559129" y="4693927"/>
+            <a:ext cx="114300" cy="1466850"/>
+          </a:xfrm>
+          <a:prstGeom prst="rect">
+            <a:avLst/>
+          </a:prstGeom>
+          <a:solidFill>
+            <a:schemeClr val="tx1"/>
+          </a:solidFill>
+          <a:ln>
+            <a:noFill/>
+          </a:ln>
+        </p:spPr>
+        <p:style>
+          <a:lnRef idx="2">
+            <a:schemeClr val="accent1">
+              <a:shade val="50000"/>
+            </a:schemeClr>
+          </a:lnRef>
+          <a:fillRef idx="1">
+            <a:schemeClr val="accent1"/>
+          </a:fillRef>
+          <a:effectRef idx="0">
+            <a:schemeClr val="accent1"/>
+          </a:effectRef>
+          <a:fontRef idx="minor">
+            <a:schemeClr val="lt1"/>
+          </a:fontRef>
+        </p:style>
+        <p:txBody>
+          <a:bodyPr rtlCol="0" anchor="ctr"/>
+          <a:lstStyle/>
+          <a:p>
+            <a:pPr algn="ctr"/>
+            <a:endParaRPr kumimoji="1" lang="ja-JP" altLang="en-US"/>
+          </a:p>
+        </p:txBody>
+      </p:sp>
+    </p:spTree>
+    <p:extLst>
+      <p:ext uri="{BB962C8B-B14F-4D97-AF65-F5344CB8AC3E}">
+        <p14:creationId xmlns:p14="http://schemas.microsoft.com/office/powerpoint/2010/main" val="4096722669"/>
+      </p:ext>
+    </p:extLst>
+  </p:cSld>
+  <p:clrMapOvr>
+    <a:masterClrMapping/>
+  </p:clrMapOvr>
+</p:sld>
+</file>
+
+<file path=ppt/slides/slide19.xml><?xml version="1.0" encoding="utf-8"?>
+<p:sld xmlns:a="http://schemas.openxmlformats.org/drawingml/2006/main" xmlns:r="http://schemas.openxmlformats.org/officeDocument/2006/relationships" xmlns:p="http://schemas.openxmlformats.org/presentationml/2006/main">
+  <p:cSld>
+    <p:bg>
+      <p:bgPr>
+        <a:solidFill>
           <a:schemeClr val="bg1"/>
         </a:solidFill>
         <a:effectLst/>
@@ -11935,400 +12537,6 @@
     <p:extLst>
       <p:ext uri="{BB962C8B-B14F-4D97-AF65-F5344CB8AC3E}">
         <p14:creationId xmlns:p14="http://schemas.microsoft.com/office/powerpoint/2010/main" val="1420475866"/>
-      </p:ext>
-    </p:extLst>
-  </p:cSld>
-  <p:clrMapOvr>
-    <a:masterClrMapping/>
-  </p:clrMapOvr>
-</p:sld>
-</file>
-
-<file path=ppt/slides/slide19.xml><?xml version="1.0" encoding="utf-8"?>
-<p:sld xmlns:a="http://schemas.openxmlformats.org/drawingml/2006/main" xmlns:r="http://schemas.openxmlformats.org/officeDocument/2006/relationships" xmlns:p="http://schemas.openxmlformats.org/presentationml/2006/main">
-  <p:cSld>
-    <p:spTree>
-      <p:nvGrpSpPr>
-        <p:cNvPr id="1" name=""/>
-        <p:cNvGrpSpPr/>
-        <p:nvPr/>
-      </p:nvGrpSpPr>
-      <p:grpSpPr>
-        <a:xfrm>
-          <a:off x="0" y="0"/>
-          <a:ext cx="0" cy="0"/>
-          <a:chOff x="0" y="0"/>
-          <a:chExt cx="0" cy="0"/>
-        </a:xfrm>
-      </p:grpSpPr>
-      <p:sp>
-        <p:nvSpPr>
-          <p:cNvPr id="2" name="四角形: 上の 2 つの角を切り取る 1">
-            <a:extLst>
-              <a:ext uri="{FF2B5EF4-FFF2-40B4-BE49-F238E27FC236}">
-                <a16:creationId xmlns:a16="http://schemas.microsoft.com/office/drawing/2014/main" id="{DBF725DF-63BB-47AB-BB42-6104F18DA38C}"/>
-              </a:ext>
-            </a:extLst>
-          </p:cNvPr>
-          <p:cNvSpPr/>
-          <p:nvPr/>
-        </p:nvSpPr>
-        <p:spPr>
-          <a:xfrm>
-            <a:off x="9848850" y="5810250"/>
-            <a:ext cx="2343150" cy="1047750"/>
-          </a:xfrm>
-          <a:prstGeom prst="snip2SameRect">
-            <a:avLst>
-              <a:gd name="adj1" fmla="val 50000"/>
-              <a:gd name="adj2" fmla="val 0"/>
-            </a:avLst>
-          </a:prstGeom>
-          <a:solidFill>
-            <a:schemeClr val="tx1"/>
-          </a:solidFill>
-          <a:ln>
-            <a:noFill/>
-          </a:ln>
-        </p:spPr>
-        <p:style>
-          <a:lnRef idx="2">
-            <a:schemeClr val="accent1">
-              <a:shade val="50000"/>
-            </a:schemeClr>
-          </a:lnRef>
-          <a:fillRef idx="1">
-            <a:schemeClr val="accent1"/>
-          </a:fillRef>
-          <a:effectRef idx="0">
-            <a:schemeClr val="accent1"/>
-          </a:effectRef>
-          <a:fontRef idx="minor">
-            <a:schemeClr val="lt1"/>
-          </a:fontRef>
-        </p:style>
-        <p:txBody>
-          <a:bodyPr rtlCol="0" anchor="ctr"/>
-          <a:lstStyle/>
-          <a:p>
-            <a:pPr algn="ctr"/>
-            <a:endParaRPr kumimoji="1" lang="ja-JP" altLang="en-US"/>
-          </a:p>
-        </p:txBody>
-      </p:sp>
-      <p:sp>
-        <p:nvSpPr>
-          <p:cNvPr id="5" name="テキスト ボックス 4">
-            <a:extLst>
-              <a:ext uri="{FF2B5EF4-FFF2-40B4-BE49-F238E27FC236}">
-                <a16:creationId xmlns:a16="http://schemas.microsoft.com/office/drawing/2014/main" id="{DF2067D4-41DF-4F63-85C2-C934976EDB47}"/>
-              </a:ext>
-            </a:extLst>
-          </p:cNvPr>
-          <p:cNvSpPr txBox="1"/>
-          <p:nvPr/>
-        </p:nvSpPr>
-        <p:spPr>
-          <a:xfrm>
-            <a:off x="2334825" y="6256704"/>
-            <a:ext cx="4509857" cy="523220"/>
-          </a:xfrm>
-          <a:prstGeom prst="rect">
-            <a:avLst/>
-          </a:prstGeom>
-          <a:noFill/>
-        </p:spPr>
-        <p:txBody>
-          <a:bodyPr wrap="square" rtlCol="0">
-            <a:spAutoFit/>
-          </a:bodyPr>
-          <a:lstStyle/>
-          <a:p>
-            <a:r>
-              <a:rPr kumimoji="1" lang="en-US" altLang="ja-JP" sz="2800" dirty="0">
-                <a:solidFill>
-                  <a:srgbClr val="FF0000"/>
-                </a:solidFill>
-              </a:rPr>
-              <a:t>HIGH</a:t>
-            </a:r>
-            <a:r>
-              <a:rPr kumimoji="1" lang="ja-JP" altLang="en-US" sz="2800" dirty="0">
-                <a:solidFill>
-                  <a:srgbClr val="FF0000"/>
-                </a:solidFill>
-              </a:rPr>
-              <a:t> </a:t>
-            </a:r>
-            <a:r>
-              <a:rPr kumimoji="1" lang="en-US" altLang="ja-JP" sz="2800" dirty="0">
-                <a:solidFill>
-                  <a:srgbClr val="FF0000"/>
-                </a:solidFill>
-              </a:rPr>
-              <a:t>SCORE</a:t>
-            </a:r>
-            <a:endParaRPr kumimoji="1" lang="ja-JP" altLang="en-US" sz="2800" dirty="0">
-              <a:solidFill>
-                <a:srgbClr val="FF0000"/>
-              </a:solidFill>
-            </a:endParaRPr>
-          </a:p>
-        </p:txBody>
-      </p:sp>
-      <p:sp>
-        <p:nvSpPr>
-          <p:cNvPr id="4" name="正方形/長方形 3">
-            <a:extLst>
-              <a:ext uri="{FF2B5EF4-FFF2-40B4-BE49-F238E27FC236}">
-                <a16:creationId xmlns:a16="http://schemas.microsoft.com/office/drawing/2014/main" id="{9E109C0C-1ABC-4953-A59B-747FA2CE9013}"/>
-              </a:ext>
-            </a:extLst>
-          </p:cNvPr>
-          <p:cNvSpPr/>
-          <p:nvPr/>
-        </p:nvSpPr>
-        <p:spPr>
-          <a:xfrm>
-            <a:off x="1473779" y="2088006"/>
-            <a:ext cx="9244441" cy="2681982"/>
-          </a:xfrm>
-          <a:prstGeom prst="rect">
-            <a:avLst/>
-          </a:prstGeom>
-          <a:noFill/>
-          <a:ln>
-            <a:noFill/>
-          </a:ln>
-        </p:spPr>
-        <p:style>
-          <a:lnRef idx="2">
-            <a:schemeClr val="accent1">
-              <a:shade val="50000"/>
-            </a:schemeClr>
-          </a:lnRef>
-          <a:fillRef idx="1">
-            <a:schemeClr val="accent1"/>
-          </a:fillRef>
-          <a:effectRef idx="0">
-            <a:schemeClr val="accent1"/>
-          </a:effectRef>
-          <a:fontRef idx="minor">
-            <a:schemeClr val="lt1"/>
-          </a:fontRef>
-        </p:style>
-        <p:txBody>
-          <a:bodyPr rtlCol="0" anchor="ctr"/>
-          <a:lstStyle/>
-          <a:p>
-            <a:pPr algn="ctr"/>
-            <a:endParaRPr kumimoji="1" lang="ja-JP" altLang="en-US"/>
-          </a:p>
-        </p:txBody>
-      </p:sp>
-      <p:sp>
-        <p:nvSpPr>
-          <p:cNvPr id="7" name="四角形: 角を丸くする 6">
-            <a:extLst>
-              <a:ext uri="{FF2B5EF4-FFF2-40B4-BE49-F238E27FC236}">
-                <a16:creationId xmlns:a16="http://schemas.microsoft.com/office/drawing/2014/main" id="{B350F0EF-C6B5-43EE-9C05-B81351AEAE92}"/>
-              </a:ext>
-            </a:extLst>
-          </p:cNvPr>
-          <p:cNvSpPr/>
-          <p:nvPr/>
-        </p:nvSpPr>
-        <p:spPr>
-          <a:xfrm>
-            <a:off x="3316166" y="5524681"/>
-            <a:ext cx="8773381" cy="2360351"/>
-          </a:xfrm>
-          <a:prstGeom prst="roundRect">
-            <a:avLst>
-              <a:gd name="adj" fmla="val 5361"/>
-            </a:avLst>
-          </a:prstGeom>
-          <a:noFill/>
-          <a:ln w="127000">
-            <a:solidFill>
-              <a:schemeClr val="tx1"/>
-            </a:solidFill>
-          </a:ln>
-        </p:spPr>
-        <p:style>
-          <a:lnRef idx="2">
-            <a:schemeClr val="accent1">
-              <a:shade val="50000"/>
-            </a:schemeClr>
-          </a:lnRef>
-          <a:fillRef idx="1">
-            <a:schemeClr val="accent1"/>
-          </a:fillRef>
-          <a:effectRef idx="0">
-            <a:schemeClr val="accent1"/>
-          </a:effectRef>
-          <a:fontRef idx="minor">
-            <a:schemeClr val="lt1"/>
-          </a:fontRef>
-        </p:style>
-        <p:txBody>
-          <a:bodyPr rtlCol="0" anchor="ctr"/>
-          <a:lstStyle/>
-          <a:p>
-            <a:pPr algn="ctr"/>
-            <a:endParaRPr kumimoji="1" lang="ja-JP" altLang="en-US"/>
-          </a:p>
-        </p:txBody>
-      </p:sp>
-      <p:sp>
-        <p:nvSpPr>
-          <p:cNvPr id="3" name="テキスト ボックス 2">
-            <a:extLst>
-              <a:ext uri="{FF2B5EF4-FFF2-40B4-BE49-F238E27FC236}">
-                <a16:creationId xmlns:a16="http://schemas.microsoft.com/office/drawing/2014/main" id="{75716B40-85CF-44E1-808C-BCF29C90F2D1}"/>
-              </a:ext>
-            </a:extLst>
-          </p:cNvPr>
-          <p:cNvSpPr txBox="1"/>
-          <p:nvPr/>
-        </p:nvSpPr>
-        <p:spPr>
-          <a:xfrm>
-            <a:off x="1861869" y="6040077"/>
-            <a:ext cx="4509857" cy="1200329"/>
-          </a:xfrm>
-          <a:prstGeom prst="rect">
-            <a:avLst/>
-          </a:prstGeom>
-          <a:noFill/>
-        </p:spPr>
-        <p:txBody>
-          <a:bodyPr wrap="square" rtlCol="0">
-            <a:spAutoFit/>
-          </a:bodyPr>
-          <a:lstStyle/>
-          <a:p>
-            <a:r>
-              <a:rPr kumimoji="1" lang="en-US" altLang="ja-JP" sz="7200" dirty="0">
-                <a:solidFill>
-                  <a:srgbClr val="FF0000"/>
-                </a:solidFill>
-              </a:rPr>
-              <a:t>SCORE</a:t>
-            </a:r>
-            <a:endParaRPr kumimoji="1" lang="ja-JP" altLang="en-US" sz="7200" dirty="0">
-              <a:solidFill>
-                <a:srgbClr val="FF0000"/>
-              </a:solidFill>
-            </a:endParaRPr>
-          </a:p>
-        </p:txBody>
-      </p:sp>
-      <p:sp>
-        <p:nvSpPr>
-          <p:cNvPr id="9" name="四角形: 角を丸くする 8">
-            <a:extLst>
-              <a:ext uri="{FF2B5EF4-FFF2-40B4-BE49-F238E27FC236}">
-                <a16:creationId xmlns:a16="http://schemas.microsoft.com/office/drawing/2014/main" id="{E9B20250-E9D1-4FD3-9A8F-48AF8F7A0844}"/>
-              </a:ext>
-            </a:extLst>
-          </p:cNvPr>
-          <p:cNvSpPr/>
-          <p:nvPr/>
-        </p:nvSpPr>
-        <p:spPr>
-          <a:xfrm>
-            <a:off x="1709308" y="5677824"/>
-            <a:ext cx="8773381" cy="2360351"/>
-          </a:xfrm>
-          <a:prstGeom prst="roundRect">
-            <a:avLst>
-              <a:gd name="adj" fmla="val 5361"/>
-            </a:avLst>
-          </a:prstGeom>
-          <a:solidFill>
-            <a:schemeClr val="tx1"/>
-          </a:solidFill>
-          <a:ln>
-            <a:noFill/>
-          </a:ln>
-        </p:spPr>
-        <p:style>
-          <a:lnRef idx="2">
-            <a:schemeClr val="accent1">
-              <a:shade val="50000"/>
-            </a:schemeClr>
-          </a:lnRef>
-          <a:fillRef idx="1">
-            <a:schemeClr val="accent1"/>
-          </a:fillRef>
-          <a:effectRef idx="0">
-            <a:schemeClr val="accent1"/>
-          </a:effectRef>
-          <a:fontRef idx="minor">
-            <a:schemeClr val="lt1"/>
-          </a:fontRef>
-        </p:style>
-        <p:txBody>
-          <a:bodyPr rtlCol="0" anchor="ctr"/>
-          <a:lstStyle/>
-          <a:p>
-            <a:pPr algn="ctr"/>
-            <a:endParaRPr kumimoji="1" lang="ja-JP" altLang="en-US"/>
-          </a:p>
-        </p:txBody>
-      </p:sp>
-      <p:sp>
-        <p:nvSpPr>
-          <p:cNvPr id="6" name="テキスト ボックス 5">
-            <a:extLst>
-              <a:ext uri="{FF2B5EF4-FFF2-40B4-BE49-F238E27FC236}">
-                <a16:creationId xmlns:a16="http://schemas.microsoft.com/office/drawing/2014/main" id="{1BC58FC8-0F5B-4845-A98A-F4F55E50E2AA}"/>
-              </a:ext>
-            </a:extLst>
-          </p:cNvPr>
-          <p:cNvSpPr txBox="1"/>
-          <p:nvPr/>
-        </p:nvSpPr>
-        <p:spPr>
-          <a:xfrm>
-            <a:off x="3324124" y="2088006"/>
-            <a:ext cx="4762601" cy="1200329"/>
-          </a:xfrm>
-          <a:prstGeom prst="rect">
-            <a:avLst/>
-          </a:prstGeom>
-          <a:noFill/>
-        </p:spPr>
-        <p:txBody>
-          <a:bodyPr wrap="square" rtlCol="0">
-            <a:spAutoFit/>
-          </a:bodyPr>
-          <a:lstStyle/>
-          <a:p>
-            <a:pPr algn="ctr"/>
-            <a:r>
-              <a:rPr kumimoji="1" lang="ja-JP" altLang="en-US" sz="7200" b="1" dirty="0">
-                <a:effectLst>
-                  <a:outerShdw blurRad="50800" dist="38100" dir="2700000" algn="tl" rotWithShape="0">
-                    <a:schemeClr val="bg1">
-                      <a:lumMod val="65000"/>
-                      <a:lumOff val="35000"/>
-                    </a:schemeClr>
-                  </a:outerShdw>
-                </a:effectLst>
-                <a:latin typeface="游明朝 Demibold" panose="02020600000000000000" pitchFamily="18" charset="-128"/>
-                <a:ea typeface="游明朝 Demibold" panose="02020600000000000000" pitchFamily="18" charset="-128"/>
-              </a:rPr>
-              <a:t>最大コンボ</a:t>
-            </a:r>
-          </a:p>
-        </p:txBody>
-      </p:sp>
-    </p:spTree>
-    <p:extLst>
-      <p:ext uri="{BB962C8B-B14F-4D97-AF65-F5344CB8AC3E}">
-        <p14:creationId xmlns:p14="http://schemas.microsoft.com/office/powerpoint/2010/main" val="3193672596"/>
       </p:ext>
     </p:extLst>
   </p:cSld>
@@ -12630,6 +12838,400 @@
       </p:grpSpPr>
       <p:sp>
         <p:nvSpPr>
+          <p:cNvPr id="2" name="四角形: 上の 2 つの角を切り取る 1">
+            <a:extLst>
+              <a:ext uri="{FF2B5EF4-FFF2-40B4-BE49-F238E27FC236}">
+                <a16:creationId xmlns:a16="http://schemas.microsoft.com/office/drawing/2014/main" id="{DBF725DF-63BB-47AB-BB42-6104F18DA38C}"/>
+              </a:ext>
+            </a:extLst>
+          </p:cNvPr>
+          <p:cNvSpPr/>
+          <p:nvPr/>
+        </p:nvSpPr>
+        <p:spPr>
+          <a:xfrm>
+            <a:off x="9848850" y="5810250"/>
+            <a:ext cx="2343150" cy="1047750"/>
+          </a:xfrm>
+          <a:prstGeom prst="snip2SameRect">
+            <a:avLst>
+              <a:gd name="adj1" fmla="val 50000"/>
+              <a:gd name="adj2" fmla="val 0"/>
+            </a:avLst>
+          </a:prstGeom>
+          <a:solidFill>
+            <a:schemeClr val="tx1"/>
+          </a:solidFill>
+          <a:ln>
+            <a:noFill/>
+          </a:ln>
+        </p:spPr>
+        <p:style>
+          <a:lnRef idx="2">
+            <a:schemeClr val="accent1">
+              <a:shade val="50000"/>
+            </a:schemeClr>
+          </a:lnRef>
+          <a:fillRef idx="1">
+            <a:schemeClr val="accent1"/>
+          </a:fillRef>
+          <a:effectRef idx="0">
+            <a:schemeClr val="accent1"/>
+          </a:effectRef>
+          <a:fontRef idx="minor">
+            <a:schemeClr val="lt1"/>
+          </a:fontRef>
+        </p:style>
+        <p:txBody>
+          <a:bodyPr rtlCol="0" anchor="ctr"/>
+          <a:lstStyle/>
+          <a:p>
+            <a:pPr algn="ctr"/>
+            <a:endParaRPr kumimoji="1" lang="ja-JP" altLang="en-US"/>
+          </a:p>
+        </p:txBody>
+      </p:sp>
+      <p:sp>
+        <p:nvSpPr>
+          <p:cNvPr id="5" name="テキスト ボックス 4">
+            <a:extLst>
+              <a:ext uri="{FF2B5EF4-FFF2-40B4-BE49-F238E27FC236}">
+                <a16:creationId xmlns:a16="http://schemas.microsoft.com/office/drawing/2014/main" id="{DF2067D4-41DF-4F63-85C2-C934976EDB47}"/>
+              </a:ext>
+            </a:extLst>
+          </p:cNvPr>
+          <p:cNvSpPr txBox="1"/>
+          <p:nvPr/>
+        </p:nvSpPr>
+        <p:spPr>
+          <a:xfrm>
+            <a:off x="2334825" y="6256704"/>
+            <a:ext cx="4509857" cy="523220"/>
+          </a:xfrm>
+          <a:prstGeom prst="rect">
+            <a:avLst/>
+          </a:prstGeom>
+          <a:noFill/>
+        </p:spPr>
+        <p:txBody>
+          <a:bodyPr wrap="square" rtlCol="0">
+            <a:spAutoFit/>
+          </a:bodyPr>
+          <a:lstStyle/>
+          <a:p>
+            <a:r>
+              <a:rPr kumimoji="1" lang="en-US" altLang="ja-JP" sz="2800" dirty="0">
+                <a:solidFill>
+                  <a:srgbClr val="FF0000"/>
+                </a:solidFill>
+              </a:rPr>
+              <a:t>HIGH</a:t>
+            </a:r>
+            <a:r>
+              <a:rPr kumimoji="1" lang="ja-JP" altLang="en-US" sz="2800" dirty="0">
+                <a:solidFill>
+                  <a:srgbClr val="FF0000"/>
+                </a:solidFill>
+              </a:rPr>
+              <a:t> </a:t>
+            </a:r>
+            <a:r>
+              <a:rPr kumimoji="1" lang="en-US" altLang="ja-JP" sz="2800" dirty="0">
+                <a:solidFill>
+                  <a:srgbClr val="FF0000"/>
+                </a:solidFill>
+              </a:rPr>
+              <a:t>SCORE</a:t>
+            </a:r>
+            <a:endParaRPr kumimoji="1" lang="ja-JP" altLang="en-US" sz="2800" dirty="0">
+              <a:solidFill>
+                <a:srgbClr val="FF0000"/>
+              </a:solidFill>
+            </a:endParaRPr>
+          </a:p>
+        </p:txBody>
+      </p:sp>
+      <p:sp>
+        <p:nvSpPr>
+          <p:cNvPr id="4" name="正方形/長方形 3">
+            <a:extLst>
+              <a:ext uri="{FF2B5EF4-FFF2-40B4-BE49-F238E27FC236}">
+                <a16:creationId xmlns:a16="http://schemas.microsoft.com/office/drawing/2014/main" id="{9E109C0C-1ABC-4953-A59B-747FA2CE9013}"/>
+              </a:ext>
+            </a:extLst>
+          </p:cNvPr>
+          <p:cNvSpPr/>
+          <p:nvPr/>
+        </p:nvSpPr>
+        <p:spPr>
+          <a:xfrm>
+            <a:off x="1473779" y="2088006"/>
+            <a:ext cx="9244441" cy="2681982"/>
+          </a:xfrm>
+          <a:prstGeom prst="rect">
+            <a:avLst/>
+          </a:prstGeom>
+          <a:noFill/>
+          <a:ln>
+            <a:noFill/>
+          </a:ln>
+        </p:spPr>
+        <p:style>
+          <a:lnRef idx="2">
+            <a:schemeClr val="accent1">
+              <a:shade val="50000"/>
+            </a:schemeClr>
+          </a:lnRef>
+          <a:fillRef idx="1">
+            <a:schemeClr val="accent1"/>
+          </a:fillRef>
+          <a:effectRef idx="0">
+            <a:schemeClr val="accent1"/>
+          </a:effectRef>
+          <a:fontRef idx="minor">
+            <a:schemeClr val="lt1"/>
+          </a:fontRef>
+        </p:style>
+        <p:txBody>
+          <a:bodyPr rtlCol="0" anchor="ctr"/>
+          <a:lstStyle/>
+          <a:p>
+            <a:pPr algn="ctr"/>
+            <a:endParaRPr kumimoji="1" lang="ja-JP" altLang="en-US"/>
+          </a:p>
+        </p:txBody>
+      </p:sp>
+      <p:sp>
+        <p:nvSpPr>
+          <p:cNvPr id="7" name="四角形: 角を丸くする 6">
+            <a:extLst>
+              <a:ext uri="{FF2B5EF4-FFF2-40B4-BE49-F238E27FC236}">
+                <a16:creationId xmlns:a16="http://schemas.microsoft.com/office/drawing/2014/main" id="{B350F0EF-C6B5-43EE-9C05-B81351AEAE92}"/>
+              </a:ext>
+            </a:extLst>
+          </p:cNvPr>
+          <p:cNvSpPr/>
+          <p:nvPr/>
+        </p:nvSpPr>
+        <p:spPr>
+          <a:xfrm>
+            <a:off x="3316166" y="5524681"/>
+            <a:ext cx="8773381" cy="2360351"/>
+          </a:xfrm>
+          <a:prstGeom prst="roundRect">
+            <a:avLst>
+              <a:gd name="adj" fmla="val 5361"/>
+            </a:avLst>
+          </a:prstGeom>
+          <a:noFill/>
+          <a:ln w="127000">
+            <a:solidFill>
+              <a:schemeClr val="tx1"/>
+            </a:solidFill>
+          </a:ln>
+        </p:spPr>
+        <p:style>
+          <a:lnRef idx="2">
+            <a:schemeClr val="accent1">
+              <a:shade val="50000"/>
+            </a:schemeClr>
+          </a:lnRef>
+          <a:fillRef idx="1">
+            <a:schemeClr val="accent1"/>
+          </a:fillRef>
+          <a:effectRef idx="0">
+            <a:schemeClr val="accent1"/>
+          </a:effectRef>
+          <a:fontRef idx="minor">
+            <a:schemeClr val="lt1"/>
+          </a:fontRef>
+        </p:style>
+        <p:txBody>
+          <a:bodyPr rtlCol="0" anchor="ctr"/>
+          <a:lstStyle/>
+          <a:p>
+            <a:pPr algn="ctr"/>
+            <a:endParaRPr kumimoji="1" lang="ja-JP" altLang="en-US"/>
+          </a:p>
+        </p:txBody>
+      </p:sp>
+      <p:sp>
+        <p:nvSpPr>
+          <p:cNvPr id="3" name="テキスト ボックス 2">
+            <a:extLst>
+              <a:ext uri="{FF2B5EF4-FFF2-40B4-BE49-F238E27FC236}">
+                <a16:creationId xmlns:a16="http://schemas.microsoft.com/office/drawing/2014/main" id="{75716B40-85CF-44E1-808C-BCF29C90F2D1}"/>
+              </a:ext>
+            </a:extLst>
+          </p:cNvPr>
+          <p:cNvSpPr txBox="1"/>
+          <p:nvPr/>
+        </p:nvSpPr>
+        <p:spPr>
+          <a:xfrm>
+            <a:off x="1861869" y="6040077"/>
+            <a:ext cx="4509857" cy="1200329"/>
+          </a:xfrm>
+          <a:prstGeom prst="rect">
+            <a:avLst/>
+          </a:prstGeom>
+          <a:noFill/>
+        </p:spPr>
+        <p:txBody>
+          <a:bodyPr wrap="square" rtlCol="0">
+            <a:spAutoFit/>
+          </a:bodyPr>
+          <a:lstStyle/>
+          <a:p>
+            <a:r>
+              <a:rPr kumimoji="1" lang="en-US" altLang="ja-JP" sz="7200" dirty="0">
+                <a:solidFill>
+                  <a:srgbClr val="FF0000"/>
+                </a:solidFill>
+              </a:rPr>
+              <a:t>SCORE</a:t>
+            </a:r>
+            <a:endParaRPr kumimoji="1" lang="ja-JP" altLang="en-US" sz="7200" dirty="0">
+              <a:solidFill>
+                <a:srgbClr val="FF0000"/>
+              </a:solidFill>
+            </a:endParaRPr>
+          </a:p>
+        </p:txBody>
+      </p:sp>
+      <p:sp>
+        <p:nvSpPr>
+          <p:cNvPr id="9" name="四角形: 角を丸くする 8">
+            <a:extLst>
+              <a:ext uri="{FF2B5EF4-FFF2-40B4-BE49-F238E27FC236}">
+                <a16:creationId xmlns:a16="http://schemas.microsoft.com/office/drawing/2014/main" id="{E9B20250-E9D1-4FD3-9A8F-48AF8F7A0844}"/>
+              </a:ext>
+            </a:extLst>
+          </p:cNvPr>
+          <p:cNvSpPr/>
+          <p:nvPr/>
+        </p:nvSpPr>
+        <p:spPr>
+          <a:xfrm>
+            <a:off x="1709308" y="5677824"/>
+            <a:ext cx="8773381" cy="2360351"/>
+          </a:xfrm>
+          <a:prstGeom prst="roundRect">
+            <a:avLst>
+              <a:gd name="adj" fmla="val 5361"/>
+            </a:avLst>
+          </a:prstGeom>
+          <a:solidFill>
+            <a:schemeClr val="tx1"/>
+          </a:solidFill>
+          <a:ln>
+            <a:noFill/>
+          </a:ln>
+        </p:spPr>
+        <p:style>
+          <a:lnRef idx="2">
+            <a:schemeClr val="accent1">
+              <a:shade val="50000"/>
+            </a:schemeClr>
+          </a:lnRef>
+          <a:fillRef idx="1">
+            <a:schemeClr val="accent1"/>
+          </a:fillRef>
+          <a:effectRef idx="0">
+            <a:schemeClr val="accent1"/>
+          </a:effectRef>
+          <a:fontRef idx="minor">
+            <a:schemeClr val="lt1"/>
+          </a:fontRef>
+        </p:style>
+        <p:txBody>
+          <a:bodyPr rtlCol="0" anchor="ctr"/>
+          <a:lstStyle/>
+          <a:p>
+            <a:pPr algn="ctr"/>
+            <a:endParaRPr kumimoji="1" lang="ja-JP" altLang="en-US"/>
+          </a:p>
+        </p:txBody>
+      </p:sp>
+      <p:sp>
+        <p:nvSpPr>
+          <p:cNvPr id="6" name="テキスト ボックス 5">
+            <a:extLst>
+              <a:ext uri="{FF2B5EF4-FFF2-40B4-BE49-F238E27FC236}">
+                <a16:creationId xmlns:a16="http://schemas.microsoft.com/office/drawing/2014/main" id="{1BC58FC8-0F5B-4845-A98A-F4F55E50E2AA}"/>
+              </a:ext>
+            </a:extLst>
+          </p:cNvPr>
+          <p:cNvSpPr txBox="1"/>
+          <p:nvPr/>
+        </p:nvSpPr>
+        <p:spPr>
+          <a:xfrm>
+            <a:off x="3324124" y="2088006"/>
+            <a:ext cx="4762601" cy="1200329"/>
+          </a:xfrm>
+          <a:prstGeom prst="rect">
+            <a:avLst/>
+          </a:prstGeom>
+          <a:noFill/>
+        </p:spPr>
+        <p:txBody>
+          <a:bodyPr wrap="square" rtlCol="0">
+            <a:spAutoFit/>
+          </a:bodyPr>
+          <a:lstStyle/>
+          <a:p>
+            <a:pPr algn="ctr"/>
+            <a:r>
+              <a:rPr kumimoji="1" lang="ja-JP" altLang="en-US" sz="7200" b="1" dirty="0">
+                <a:effectLst>
+                  <a:outerShdw blurRad="50800" dist="38100" dir="2700000" algn="tl" rotWithShape="0">
+                    <a:schemeClr val="bg1">
+                      <a:lumMod val="65000"/>
+                      <a:lumOff val="35000"/>
+                    </a:schemeClr>
+                  </a:outerShdw>
+                </a:effectLst>
+                <a:latin typeface="游明朝 Demibold" panose="02020600000000000000" pitchFamily="18" charset="-128"/>
+                <a:ea typeface="游明朝 Demibold" panose="02020600000000000000" pitchFamily="18" charset="-128"/>
+              </a:rPr>
+              <a:t>最大コンボ</a:t>
+            </a:r>
+          </a:p>
+        </p:txBody>
+      </p:sp>
+    </p:spTree>
+    <p:extLst>
+      <p:ext uri="{BB962C8B-B14F-4D97-AF65-F5344CB8AC3E}">
+        <p14:creationId xmlns:p14="http://schemas.microsoft.com/office/powerpoint/2010/main" val="3193672596"/>
+      </p:ext>
+    </p:extLst>
+  </p:cSld>
+  <p:clrMapOvr>
+    <a:masterClrMapping/>
+  </p:clrMapOvr>
+</p:sld>
+</file>
+
+<file path=ppt/slides/slide21.xml><?xml version="1.0" encoding="utf-8"?>
+<p:sld xmlns:a="http://schemas.openxmlformats.org/drawingml/2006/main" xmlns:r="http://schemas.openxmlformats.org/officeDocument/2006/relationships" xmlns:p="http://schemas.openxmlformats.org/presentationml/2006/main">
+  <p:cSld>
+    <p:spTree>
+      <p:nvGrpSpPr>
+        <p:cNvPr id="1" name=""/>
+        <p:cNvGrpSpPr/>
+        <p:nvPr/>
+      </p:nvGrpSpPr>
+      <p:grpSpPr>
+        <a:xfrm>
+          <a:off x="0" y="0"/>
+          <a:ext cx="0" cy="0"/>
+          <a:chOff x="0" y="0"/>
+          <a:chExt cx="0" cy="0"/>
+        </a:xfrm>
+      </p:grpSpPr>
+      <p:sp>
+        <p:nvSpPr>
           <p:cNvPr id="3" name="四角形: 対角を切り取る 2">
             <a:extLst>
               <a:ext uri="{FF2B5EF4-FFF2-40B4-BE49-F238E27FC236}">
@@ -12858,7 +13460,7 @@
 </p:sld>
 </file>
 
-<file path=ppt/slides/slide21.xml><?xml version="1.0" encoding="utf-8"?>
+<file path=ppt/slides/slide22.xml><?xml version="1.0" encoding="utf-8"?>
 <p:sld xmlns:a="http://schemas.openxmlformats.org/drawingml/2006/main" xmlns:r="http://schemas.openxmlformats.org/officeDocument/2006/relationships" xmlns:p="http://schemas.openxmlformats.org/presentationml/2006/main">
   <p:cSld>
     <p:spTree>
@@ -13230,7 +13832,7 @@
 </p:sld>
 </file>
 
-<file path=ppt/slides/slide22.xml><?xml version="1.0" encoding="utf-8"?>
+<file path=ppt/slides/slide23.xml><?xml version="1.0" encoding="utf-8"?>
 <p:sld xmlns:a="http://schemas.openxmlformats.org/drawingml/2006/main" xmlns:r="http://schemas.openxmlformats.org/officeDocument/2006/relationships" xmlns:p="http://schemas.openxmlformats.org/presentationml/2006/main">
   <p:cSld>
     <p:bg>
@@ -13825,7 +14427,7 @@
 </p:sld>
 </file>
 
-<file path=ppt/slides/slide23.xml><?xml version="1.0" encoding="utf-8"?>
+<file path=ppt/slides/slide24.xml><?xml version="1.0" encoding="utf-8"?>
 <p:sld xmlns:a="http://schemas.openxmlformats.org/drawingml/2006/main" xmlns:r="http://schemas.openxmlformats.org/officeDocument/2006/relationships" xmlns:p="http://schemas.openxmlformats.org/presentationml/2006/main">
   <p:cSld>
     <p:spTree>
@@ -14410,7 +15012,7 @@
 </p:sld>
 </file>
 
-<file path=ppt/slides/slide24.xml><?xml version="1.0" encoding="utf-8"?>
+<file path=ppt/slides/slide25.xml><?xml version="1.0" encoding="utf-8"?>
 <p:sld xmlns:a="http://schemas.openxmlformats.org/drawingml/2006/main" xmlns:r="http://schemas.openxmlformats.org/officeDocument/2006/relationships" xmlns:p="http://schemas.openxmlformats.org/presentationml/2006/main">
   <p:cSld>
     <p:bg>
@@ -15199,7 +15801,7 @@
 </p:sld>
 </file>
 
-<file path=ppt/slides/slide25.xml><?xml version="1.0" encoding="utf-8"?>
+<file path=ppt/slides/slide26.xml><?xml version="1.0" encoding="utf-8"?>
 <p:sld xmlns:a="http://schemas.openxmlformats.org/drawingml/2006/main" xmlns:r="http://schemas.openxmlformats.org/officeDocument/2006/relationships" xmlns:p="http://schemas.openxmlformats.org/presentationml/2006/main">
   <p:cSld>
     <p:bg>
@@ -15708,7 +16310,7 @@
 </p:sld>
 </file>
 
-<file path=ppt/slides/slide26.xml><?xml version="1.0" encoding="utf-8"?>
+<file path=ppt/slides/slide27.xml><?xml version="1.0" encoding="utf-8"?>
 <p:sld xmlns:a="http://schemas.openxmlformats.org/drawingml/2006/main" xmlns:r="http://schemas.openxmlformats.org/officeDocument/2006/relationships" xmlns:p="http://schemas.openxmlformats.org/presentationml/2006/main">
   <p:cSld>
     <p:spTree>
@@ -16070,7 +16672,7 @@
 </p:sld>
 </file>
 
-<file path=ppt/slides/slide27.xml><?xml version="1.0" encoding="utf-8"?>
+<file path=ppt/slides/slide28.xml><?xml version="1.0" encoding="utf-8"?>
 <p:sld xmlns:a="http://schemas.openxmlformats.org/drawingml/2006/main" xmlns:r="http://schemas.openxmlformats.org/officeDocument/2006/relationships" xmlns:p="http://schemas.openxmlformats.org/presentationml/2006/main">
   <p:cSld>
     <p:bg>
@@ -16739,7 +17341,7 @@
 </p:sld>
 </file>
 
-<file path=ppt/slides/slide28.xml><?xml version="1.0" encoding="utf-8"?>
+<file path=ppt/slides/slide29.xml><?xml version="1.0" encoding="utf-8"?>
 <p:sld xmlns:a="http://schemas.openxmlformats.org/drawingml/2006/main" xmlns:r="http://schemas.openxmlformats.org/officeDocument/2006/relationships" xmlns:p="http://schemas.openxmlformats.org/presentationml/2006/main">
   <p:cSld>
     <p:spTree>
@@ -17057,489 +17659,6 @@
     <p:extLst>
       <p:ext uri="{BB962C8B-B14F-4D97-AF65-F5344CB8AC3E}">
         <p14:creationId xmlns:p14="http://schemas.microsoft.com/office/powerpoint/2010/main" val="1001234843"/>
-      </p:ext>
-    </p:extLst>
-  </p:cSld>
-  <p:clrMapOvr>
-    <a:masterClrMapping/>
-  </p:clrMapOvr>
-</p:sld>
-</file>
-
-<file path=ppt/slides/slide29.xml><?xml version="1.0" encoding="utf-8"?>
-<p:sld xmlns:a="http://schemas.openxmlformats.org/drawingml/2006/main" xmlns:r="http://schemas.openxmlformats.org/officeDocument/2006/relationships" xmlns:p="http://schemas.openxmlformats.org/presentationml/2006/main">
-  <p:cSld>
-    <p:spTree>
-      <p:nvGrpSpPr>
-        <p:cNvPr id="1" name=""/>
-        <p:cNvGrpSpPr/>
-        <p:nvPr/>
-      </p:nvGrpSpPr>
-      <p:grpSpPr>
-        <a:xfrm>
-          <a:off x="0" y="0"/>
-          <a:ext cx="0" cy="0"/>
-          <a:chOff x="0" y="0"/>
-          <a:chExt cx="0" cy="0"/>
-        </a:xfrm>
-      </p:grpSpPr>
-      <p:sp>
-        <p:nvSpPr>
-          <p:cNvPr id="13" name="正方形/長方形 12">
-            <a:extLst>
-              <a:ext uri="{FF2B5EF4-FFF2-40B4-BE49-F238E27FC236}">
-                <a16:creationId xmlns:a16="http://schemas.microsoft.com/office/drawing/2014/main" id="{D18F96B9-AF18-4E61-9B14-E2A4734D836A}"/>
-              </a:ext>
-            </a:extLst>
-          </p:cNvPr>
-          <p:cNvSpPr/>
-          <p:nvPr/>
-        </p:nvSpPr>
-        <p:spPr>
-          <a:xfrm>
-            <a:off x="600075" y="314325"/>
-            <a:ext cx="6217200" cy="5396400"/>
-          </a:xfrm>
-          <a:prstGeom prst="rect">
-            <a:avLst/>
-          </a:prstGeom>
-          <a:solidFill>
-            <a:schemeClr val="tx1">
-              <a:lumMod val="85000"/>
-            </a:schemeClr>
-          </a:solidFill>
-          <a:ln>
-            <a:noFill/>
-          </a:ln>
-        </p:spPr>
-        <p:style>
-          <a:lnRef idx="2">
-            <a:schemeClr val="accent1">
-              <a:shade val="50000"/>
-            </a:schemeClr>
-          </a:lnRef>
-          <a:fillRef idx="1">
-            <a:schemeClr val="accent1"/>
-          </a:fillRef>
-          <a:effectRef idx="0">
-            <a:schemeClr val="accent1"/>
-          </a:effectRef>
-          <a:fontRef idx="minor">
-            <a:schemeClr val="lt1"/>
-          </a:fontRef>
-        </p:style>
-        <p:txBody>
-          <a:bodyPr rtlCol="0" anchor="ctr"/>
-          <a:lstStyle/>
-          <a:p>
-            <a:pPr algn="ctr"/>
-            <a:endParaRPr kumimoji="1" lang="ja-JP" altLang="en-US"/>
-          </a:p>
-        </p:txBody>
-      </p:sp>
-      <p:sp>
-        <p:nvSpPr>
-          <p:cNvPr id="14" name="正方形/長方形 13">
-            <a:extLst>
-              <a:ext uri="{FF2B5EF4-FFF2-40B4-BE49-F238E27FC236}">
-                <a16:creationId xmlns:a16="http://schemas.microsoft.com/office/drawing/2014/main" id="{F99C553D-07EE-485C-8267-A1F987F491C2}"/>
-              </a:ext>
-            </a:extLst>
-          </p:cNvPr>
-          <p:cNvSpPr>
-            <a:spLocks noChangeAspect="1"/>
-          </p:cNvSpPr>
-          <p:nvPr/>
-        </p:nvSpPr>
-        <p:spPr>
-          <a:xfrm>
-            <a:off x="909068" y="582525"/>
-            <a:ext cx="5599213" cy="4860000"/>
-          </a:xfrm>
-          <a:prstGeom prst="rect">
-            <a:avLst/>
-          </a:prstGeom>
-          <a:solidFill>
-            <a:schemeClr val="tx1"/>
-          </a:solidFill>
-          <a:ln>
-            <a:noFill/>
-          </a:ln>
-        </p:spPr>
-        <p:style>
-          <a:lnRef idx="2">
-            <a:schemeClr val="accent1">
-              <a:shade val="50000"/>
-            </a:schemeClr>
-          </a:lnRef>
-          <a:fillRef idx="1">
-            <a:schemeClr val="accent1"/>
-          </a:fillRef>
-          <a:effectRef idx="0">
-            <a:schemeClr val="accent1"/>
-          </a:effectRef>
-          <a:fontRef idx="minor">
-            <a:schemeClr val="lt1"/>
-          </a:fontRef>
-        </p:style>
-        <p:txBody>
-          <a:bodyPr rtlCol="0" anchor="ctr"/>
-          <a:lstStyle/>
-          <a:p>
-            <a:pPr algn="ctr"/>
-            <a:endParaRPr kumimoji="1" lang="ja-JP" altLang="en-US" dirty="0"/>
-          </a:p>
-        </p:txBody>
-      </p:sp>
-      <p:sp>
-        <p:nvSpPr>
-          <p:cNvPr id="6" name="正方形/長方形 5">
-            <a:extLst>
-              <a:ext uri="{FF2B5EF4-FFF2-40B4-BE49-F238E27FC236}">
-                <a16:creationId xmlns:a16="http://schemas.microsoft.com/office/drawing/2014/main" id="{ACF922AD-DCB1-4B12-ACF6-F6D2C5A2F0A6}"/>
-              </a:ext>
-            </a:extLst>
-          </p:cNvPr>
-          <p:cNvSpPr>
-            <a:spLocks noChangeAspect="1"/>
-          </p:cNvSpPr>
-          <p:nvPr/>
-        </p:nvSpPr>
-        <p:spPr>
-          <a:xfrm>
-            <a:off x="987461" y="831297"/>
-            <a:ext cx="5375239" cy="4512228"/>
-          </a:xfrm>
-          <a:prstGeom prst="rect">
-            <a:avLst/>
-          </a:prstGeom>
-          <a:solidFill>
-            <a:schemeClr val="bg1"/>
-          </a:solidFill>
-          <a:ln>
-            <a:noFill/>
-          </a:ln>
-        </p:spPr>
-        <p:style>
-          <a:lnRef idx="2">
-            <a:schemeClr val="accent1">
-              <a:shade val="50000"/>
-            </a:schemeClr>
-          </a:lnRef>
-          <a:fillRef idx="1">
-            <a:schemeClr val="accent1"/>
-          </a:fillRef>
-          <a:effectRef idx="0">
-            <a:schemeClr val="accent1"/>
-          </a:effectRef>
-          <a:fontRef idx="minor">
-            <a:schemeClr val="lt1"/>
-          </a:fontRef>
-        </p:style>
-        <p:txBody>
-          <a:bodyPr rtlCol="0" anchor="ctr"/>
-          <a:lstStyle/>
-          <a:p>
-            <a:pPr algn="ctr"/>
-            <a:endParaRPr kumimoji="1" lang="ja-JP" altLang="en-US" dirty="0"/>
-          </a:p>
-        </p:txBody>
-      </p:sp>
-      <p:sp>
-        <p:nvSpPr>
-          <p:cNvPr id="2" name="四角形: 角を丸くする 1">
-            <a:extLst>
-              <a:ext uri="{FF2B5EF4-FFF2-40B4-BE49-F238E27FC236}">
-                <a16:creationId xmlns:a16="http://schemas.microsoft.com/office/drawing/2014/main" id="{9741F51D-5745-4C0B-A20D-A73A9653455C}"/>
-              </a:ext>
-            </a:extLst>
-          </p:cNvPr>
-          <p:cNvSpPr/>
-          <p:nvPr/>
-        </p:nvSpPr>
-        <p:spPr>
-          <a:xfrm>
-            <a:off x="3017666" y="4027627"/>
-            <a:ext cx="2880000" cy="2880000"/>
-          </a:xfrm>
-          <a:prstGeom prst="roundRect">
-            <a:avLst/>
-          </a:prstGeom>
-          <a:noFill/>
-          <a:ln w="127000">
-            <a:solidFill>
-              <a:schemeClr val="tx1"/>
-            </a:solidFill>
-          </a:ln>
-        </p:spPr>
-        <p:style>
-          <a:lnRef idx="2">
-            <a:schemeClr val="accent1">
-              <a:shade val="50000"/>
-            </a:schemeClr>
-          </a:lnRef>
-          <a:fillRef idx="1">
-            <a:schemeClr val="accent1"/>
-          </a:fillRef>
-          <a:effectRef idx="0">
-            <a:schemeClr val="accent1"/>
-          </a:effectRef>
-          <a:fontRef idx="minor">
-            <a:schemeClr val="lt1"/>
-          </a:fontRef>
-        </p:style>
-        <p:txBody>
-          <a:bodyPr rtlCol="0" anchor="ctr"/>
-          <a:lstStyle/>
-          <a:p>
-            <a:pPr algn="ctr"/>
-            <a:endParaRPr kumimoji="1" lang="ja-JP" altLang="en-US"/>
-          </a:p>
-        </p:txBody>
-      </p:sp>
-      <p:grpSp>
-        <p:nvGrpSpPr>
-          <p:cNvPr id="9" name="グループ化 8">
-            <a:extLst>
-              <a:ext uri="{FF2B5EF4-FFF2-40B4-BE49-F238E27FC236}">
-                <a16:creationId xmlns:a16="http://schemas.microsoft.com/office/drawing/2014/main" id="{5F398E7A-8994-4416-AC2A-4BE81E881A83}"/>
-              </a:ext>
-            </a:extLst>
-          </p:cNvPr>
-          <p:cNvGrpSpPr/>
-          <p:nvPr/>
-        </p:nvGrpSpPr>
-        <p:grpSpPr>
-          <a:xfrm>
-            <a:off x="7573889" y="1723929"/>
-            <a:ext cx="3396976" cy="2284367"/>
-            <a:chOff x="1581773" y="1310504"/>
-            <a:chExt cx="3396976" cy="2284367"/>
-          </a:xfrm>
-        </p:grpSpPr>
-        <p:sp>
-          <p:nvSpPr>
-            <p:cNvPr id="3" name="四角形: 角を丸くする 2">
-              <a:extLst>
-                <a:ext uri="{FF2B5EF4-FFF2-40B4-BE49-F238E27FC236}">
-                  <a16:creationId xmlns:a16="http://schemas.microsoft.com/office/drawing/2014/main" id="{57D09821-EE4D-4551-8D4A-F7910BCA52D8}"/>
-                </a:ext>
-              </a:extLst>
-            </p:cNvPr>
-            <p:cNvSpPr/>
-            <p:nvPr/>
-          </p:nvSpPr>
-          <p:spPr>
-            <a:xfrm>
-              <a:off x="1581773" y="1310504"/>
-              <a:ext cx="3396976" cy="1019175"/>
-            </a:xfrm>
-            <a:prstGeom prst="roundRect">
-              <a:avLst>
-                <a:gd name="adj" fmla="val 50000"/>
-              </a:avLst>
-            </a:prstGeom>
-            <a:noFill/>
-            <a:ln w="127000">
-              <a:noFill/>
-            </a:ln>
-          </p:spPr>
-          <p:style>
-            <a:lnRef idx="2">
-              <a:schemeClr val="accent1">
-                <a:shade val="50000"/>
-              </a:schemeClr>
-            </a:lnRef>
-            <a:fillRef idx="1">
-              <a:schemeClr val="accent1"/>
-            </a:fillRef>
-            <a:effectRef idx="0">
-              <a:schemeClr val="accent1"/>
-            </a:effectRef>
-            <a:fontRef idx="minor">
-              <a:schemeClr val="lt1"/>
-            </a:fontRef>
-          </p:style>
-          <p:txBody>
-            <a:bodyPr rtlCol="0" anchor="ctr"/>
-            <a:lstStyle/>
-            <a:p>
-              <a:pPr algn="ctr"/>
-              <a:r>
-                <a:rPr kumimoji="1" lang="en-US" altLang="ja-JP" sz="6600" b="1" dirty="0"/>
-                <a:t>MEMO</a:t>
-              </a:r>
-              <a:endParaRPr kumimoji="1" lang="ja-JP" altLang="en-US" sz="6600" b="1" dirty="0"/>
-            </a:p>
-          </p:txBody>
-        </p:sp>
-        <p:sp>
-          <p:nvSpPr>
-            <p:cNvPr id="5" name="四角形: 角を丸くする 4">
-              <a:extLst>
-                <a:ext uri="{FF2B5EF4-FFF2-40B4-BE49-F238E27FC236}">
-                  <a16:creationId xmlns:a16="http://schemas.microsoft.com/office/drawing/2014/main" id="{26EF3C13-66ED-4C48-95E7-F9562687B177}"/>
-                </a:ext>
-              </a:extLst>
-            </p:cNvPr>
-            <p:cNvSpPr/>
-            <p:nvPr/>
-          </p:nvSpPr>
-          <p:spPr>
-            <a:xfrm>
-              <a:off x="2108088" y="2329679"/>
-              <a:ext cx="2336889" cy="268200"/>
-            </a:xfrm>
-            <a:prstGeom prst="roundRect">
-              <a:avLst>
-                <a:gd name="adj" fmla="val 50000"/>
-              </a:avLst>
-            </a:prstGeom>
-            <a:solidFill>
-              <a:schemeClr val="tx1"/>
-            </a:solidFill>
-            <a:ln>
-              <a:noFill/>
-            </a:ln>
-          </p:spPr>
-          <p:style>
-            <a:lnRef idx="2">
-              <a:schemeClr val="accent1">
-                <a:shade val="50000"/>
-              </a:schemeClr>
-            </a:lnRef>
-            <a:fillRef idx="1">
-              <a:schemeClr val="accent1"/>
-            </a:fillRef>
-            <a:effectRef idx="0">
-              <a:schemeClr val="accent1"/>
-            </a:effectRef>
-            <a:fontRef idx="minor">
-              <a:schemeClr val="lt1"/>
-            </a:fontRef>
-          </p:style>
-          <p:txBody>
-            <a:bodyPr rtlCol="0" anchor="ctr"/>
-            <a:lstStyle/>
-            <a:p>
-              <a:pPr algn="ctr"/>
-              <a:endParaRPr kumimoji="1" lang="ja-JP" altLang="en-US"/>
-            </a:p>
-          </p:txBody>
-        </p:sp>
-        <p:sp>
-          <p:nvSpPr>
-            <p:cNvPr id="11" name="四角形: 角を丸くする 10">
-              <a:extLst>
-                <a:ext uri="{FF2B5EF4-FFF2-40B4-BE49-F238E27FC236}">
-                  <a16:creationId xmlns:a16="http://schemas.microsoft.com/office/drawing/2014/main" id="{2497FF4B-189F-4CC6-9F6E-BFD01FF516D6}"/>
-                </a:ext>
-              </a:extLst>
-            </p:cNvPr>
-            <p:cNvSpPr/>
-            <p:nvPr/>
-          </p:nvSpPr>
-          <p:spPr>
-            <a:xfrm>
-              <a:off x="2120777" y="2828175"/>
-              <a:ext cx="2336889" cy="268200"/>
-            </a:xfrm>
-            <a:prstGeom prst="roundRect">
-              <a:avLst>
-                <a:gd name="adj" fmla="val 50000"/>
-              </a:avLst>
-            </a:prstGeom>
-            <a:solidFill>
-              <a:schemeClr val="tx1"/>
-            </a:solidFill>
-            <a:ln>
-              <a:noFill/>
-            </a:ln>
-          </p:spPr>
-          <p:style>
-            <a:lnRef idx="2">
-              <a:schemeClr val="accent1">
-                <a:shade val="50000"/>
-              </a:schemeClr>
-            </a:lnRef>
-            <a:fillRef idx="1">
-              <a:schemeClr val="accent1"/>
-            </a:fillRef>
-            <a:effectRef idx="0">
-              <a:schemeClr val="accent1"/>
-            </a:effectRef>
-            <a:fontRef idx="minor">
-              <a:schemeClr val="lt1"/>
-            </a:fontRef>
-          </p:style>
-          <p:txBody>
-            <a:bodyPr rtlCol="0" anchor="ctr"/>
-            <a:lstStyle/>
-            <a:p>
-              <a:pPr algn="ctr"/>
-              <a:endParaRPr kumimoji="1" lang="ja-JP" altLang="en-US"/>
-            </a:p>
-          </p:txBody>
-        </p:sp>
-        <p:sp>
-          <p:nvSpPr>
-            <p:cNvPr id="12" name="四角形: 角を丸くする 11">
-              <a:extLst>
-                <a:ext uri="{FF2B5EF4-FFF2-40B4-BE49-F238E27FC236}">
-                  <a16:creationId xmlns:a16="http://schemas.microsoft.com/office/drawing/2014/main" id="{F480C788-4115-489B-A1A1-75DD41D93735}"/>
-                </a:ext>
-              </a:extLst>
-            </p:cNvPr>
-            <p:cNvSpPr/>
-            <p:nvPr/>
-          </p:nvSpPr>
-          <p:spPr>
-            <a:xfrm>
-              <a:off x="2120777" y="3326671"/>
-              <a:ext cx="2336889" cy="268200"/>
-            </a:xfrm>
-            <a:prstGeom prst="roundRect">
-              <a:avLst>
-                <a:gd name="adj" fmla="val 50000"/>
-              </a:avLst>
-            </a:prstGeom>
-            <a:solidFill>
-              <a:schemeClr val="tx1"/>
-            </a:solidFill>
-            <a:ln>
-              <a:noFill/>
-            </a:ln>
-          </p:spPr>
-          <p:style>
-            <a:lnRef idx="2">
-              <a:schemeClr val="accent1">
-                <a:shade val="50000"/>
-              </a:schemeClr>
-            </a:lnRef>
-            <a:fillRef idx="1">
-              <a:schemeClr val="accent1"/>
-            </a:fillRef>
-            <a:effectRef idx="0">
-              <a:schemeClr val="accent1"/>
-            </a:effectRef>
-            <a:fontRef idx="minor">
-              <a:schemeClr val="lt1"/>
-            </a:fontRef>
-          </p:style>
-          <p:txBody>
-            <a:bodyPr rtlCol="0" anchor="ctr"/>
-            <a:lstStyle/>
-            <a:p>
-              <a:pPr algn="ctr"/>
-              <a:endParaRPr kumimoji="1" lang="ja-JP" altLang="en-US"/>
-            </a:p>
-          </p:txBody>
-        </p:sp>
-      </p:grpSp>
-    </p:spTree>
-    <p:extLst>
-      <p:ext uri="{BB962C8B-B14F-4D97-AF65-F5344CB8AC3E}">
-        <p14:creationId xmlns:p14="http://schemas.microsoft.com/office/powerpoint/2010/main" val="1051524161"/>
       </p:ext>
     </p:extLst>
   </p:cSld>
@@ -18477,6 +18596,489 @@
 </file>
 
 <file path=ppt/slides/slide30.xml><?xml version="1.0" encoding="utf-8"?>
+<p:sld xmlns:a="http://schemas.openxmlformats.org/drawingml/2006/main" xmlns:r="http://schemas.openxmlformats.org/officeDocument/2006/relationships" xmlns:p="http://schemas.openxmlformats.org/presentationml/2006/main">
+  <p:cSld>
+    <p:spTree>
+      <p:nvGrpSpPr>
+        <p:cNvPr id="1" name=""/>
+        <p:cNvGrpSpPr/>
+        <p:nvPr/>
+      </p:nvGrpSpPr>
+      <p:grpSpPr>
+        <a:xfrm>
+          <a:off x="0" y="0"/>
+          <a:ext cx="0" cy="0"/>
+          <a:chOff x="0" y="0"/>
+          <a:chExt cx="0" cy="0"/>
+        </a:xfrm>
+      </p:grpSpPr>
+      <p:sp>
+        <p:nvSpPr>
+          <p:cNvPr id="13" name="正方形/長方形 12">
+            <a:extLst>
+              <a:ext uri="{FF2B5EF4-FFF2-40B4-BE49-F238E27FC236}">
+                <a16:creationId xmlns:a16="http://schemas.microsoft.com/office/drawing/2014/main" id="{D18F96B9-AF18-4E61-9B14-E2A4734D836A}"/>
+              </a:ext>
+            </a:extLst>
+          </p:cNvPr>
+          <p:cNvSpPr/>
+          <p:nvPr/>
+        </p:nvSpPr>
+        <p:spPr>
+          <a:xfrm>
+            <a:off x="600075" y="314325"/>
+            <a:ext cx="6217200" cy="5396400"/>
+          </a:xfrm>
+          <a:prstGeom prst="rect">
+            <a:avLst/>
+          </a:prstGeom>
+          <a:solidFill>
+            <a:schemeClr val="tx1">
+              <a:lumMod val="85000"/>
+            </a:schemeClr>
+          </a:solidFill>
+          <a:ln>
+            <a:noFill/>
+          </a:ln>
+        </p:spPr>
+        <p:style>
+          <a:lnRef idx="2">
+            <a:schemeClr val="accent1">
+              <a:shade val="50000"/>
+            </a:schemeClr>
+          </a:lnRef>
+          <a:fillRef idx="1">
+            <a:schemeClr val="accent1"/>
+          </a:fillRef>
+          <a:effectRef idx="0">
+            <a:schemeClr val="accent1"/>
+          </a:effectRef>
+          <a:fontRef idx="minor">
+            <a:schemeClr val="lt1"/>
+          </a:fontRef>
+        </p:style>
+        <p:txBody>
+          <a:bodyPr rtlCol="0" anchor="ctr"/>
+          <a:lstStyle/>
+          <a:p>
+            <a:pPr algn="ctr"/>
+            <a:endParaRPr kumimoji="1" lang="ja-JP" altLang="en-US"/>
+          </a:p>
+        </p:txBody>
+      </p:sp>
+      <p:sp>
+        <p:nvSpPr>
+          <p:cNvPr id="14" name="正方形/長方形 13">
+            <a:extLst>
+              <a:ext uri="{FF2B5EF4-FFF2-40B4-BE49-F238E27FC236}">
+                <a16:creationId xmlns:a16="http://schemas.microsoft.com/office/drawing/2014/main" id="{F99C553D-07EE-485C-8267-A1F987F491C2}"/>
+              </a:ext>
+            </a:extLst>
+          </p:cNvPr>
+          <p:cNvSpPr>
+            <a:spLocks noChangeAspect="1"/>
+          </p:cNvSpPr>
+          <p:nvPr/>
+        </p:nvSpPr>
+        <p:spPr>
+          <a:xfrm>
+            <a:off x="909068" y="582525"/>
+            <a:ext cx="5599213" cy="4860000"/>
+          </a:xfrm>
+          <a:prstGeom prst="rect">
+            <a:avLst/>
+          </a:prstGeom>
+          <a:solidFill>
+            <a:schemeClr val="tx1"/>
+          </a:solidFill>
+          <a:ln>
+            <a:noFill/>
+          </a:ln>
+        </p:spPr>
+        <p:style>
+          <a:lnRef idx="2">
+            <a:schemeClr val="accent1">
+              <a:shade val="50000"/>
+            </a:schemeClr>
+          </a:lnRef>
+          <a:fillRef idx="1">
+            <a:schemeClr val="accent1"/>
+          </a:fillRef>
+          <a:effectRef idx="0">
+            <a:schemeClr val="accent1"/>
+          </a:effectRef>
+          <a:fontRef idx="minor">
+            <a:schemeClr val="lt1"/>
+          </a:fontRef>
+        </p:style>
+        <p:txBody>
+          <a:bodyPr rtlCol="0" anchor="ctr"/>
+          <a:lstStyle/>
+          <a:p>
+            <a:pPr algn="ctr"/>
+            <a:endParaRPr kumimoji="1" lang="ja-JP" altLang="en-US" dirty="0"/>
+          </a:p>
+        </p:txBody>
+      </p:sp>
+      <p:sp>
+        <p:nvSpPr>
+          <p:cNvPr id="6" name="正方形/長方形 5">
+            <a:extLst>
+              <a:ext uri="{FF2B5EF4-FFF2-40B4-BE49-F238E27FC236}">
+                <a16:creationId xmlns:a16="http://schemas.microsoft.com/office/drawing/2014/main" id="{ACF922AD-DCB1-4B12-ACF6-F6D2C5A2F0A6}"/>
+              </a:ext>
+            </a:extLst>
+          </p:cNvPr>
+          <p:cNvSpPr>
+            <a:spLocks noChangeAspect="1"/>
+          </p:cNvSpPr>
+          <p:nvPr/>
+        </p:nvSpPr>
+        <p:spPr>
+          <a:xfrm>
+            <a:off x="987461" y="831297"/>
+            <a:ext cx="5375239" cy="4512228"/>
+          </a:xfrm>
+          <a:prstGeom prst="rect">
+            <a:avLst/>
+          </a:prstGeom>
+          <a:solidFill>
+            <a:schemeClr val="bg1"/>
+          </a:solidFill>
+          <a:ln>
+            <a:noFill/>
+          </a:ln>
+        </p:spPr>
+        <p:style>
+          <a:lnRef idx="2">
+            <a:schemeClr val="accent1">
+              <a:shade val="50000"/>
+            </a:schemeClr>
+          </a:lnRef>
+          <a:fillRef idx="1">
+            <a:schemeClr val="accent1"/>
+          </a:fillRef>
+          <a:effectRef idx="0">
+            <a:schemeClr val="accent1"/>
+          </a:effectRef>
+          <a:fontRef idx="minor">
+            <a:schemeClr val="lt1"/>
+          </a:fontRef>
+        </p:style>
+        <p:txBody>
+          <a:bodyPr rtlCol="0" anchor="ctr"/>
+          <a:lstStyle/>
+          <a:p>
+            <a:pPr algn="ctr"/>
+            <a:endParaRPr kumimoji="1" lang="ja-JP" altLang="en-US" dirty="0"/>
+          </a:p>
+        </p:txBody>
+      </p:sp>
+      <p:sp>
+        <p:nvSpPr>
+          <p:cNvPr id="2" name="四角形: 角を丸くする 1">
+            <a:extLst>
+              <a:ext uri="{FF2B5EF4-FFF2-40B4-BE49-F238E27FC236}">
+                <a16:creationId xmlns:a16="http://schemas.microsoft.com/office/drawing/2014/main" id="{9741F51D-5745-4C0B-A20D-A73A9653455C}"/>
+              </a:ext>
+            </a:extLst>
+          </p:cNvPr>
+          <p:cNvSpPr/>
+          <p:nvPr/>
+        </p:nvSpPr>
+        <p:spPr>
+          <a:xfrm>
+            <a:off x="3017666" y="4027627"/>
+            <a:ext cx="2880000" cy="2880000"/>
+          </a:xfrm>
+          <a:prstGeom prst="roundRect">
+            <a:avLst/>
+          </a:prstGeom>
+          <a:noFill/>
+          <a:ln w="127000">
+            <a:solidFill>
+              <a:schemeClr val="tx1"/>
+            </a:solidFill>
+          </a:ln>
+        </p:spPr>
+        <p:style>
+          <a:lnRef idx="2">
+            <a:schemeClr val="accent1">
+              <a:shade val="50000"/>
+            </a:schemeClr>
+          </a:lnRef>
+          <a:fillRef idx="1">
+            <a:schemeClr val="accent1"/>
+          </a:fillRef>
+          <a:effectRef idx="0">
+            <a:schemeClr val="accent1"/>
+          </a:effectRef>
+          <a:fontRef idx="minor">
+            <a:schemeClr val="lt1"/>
+          </a:fontRef>
+        </p:style>
+        <p:txBody>
+          <a:bodyPr rtlCol="0" anchor="ctr"/>
+          <a:lstStyle/>
+          <a:p>
+            <a:pPr algn="ctr"/>
+            <a:endParaRPr kumimoji="1" lang="ja-JP" altLang="en-US"/>
+          </a:p>
+        </p:txBody>
+      </p:sp>
+      <p:grpSp>
+        <p:nvGrpSpPr>
+          <p:cNvPr id="9" name="グループ化 8">
+            <a:extLst>
+              <a:ext uri="{FF2B5EF4-FFF2-40B4-BE49-F238E27FC236}">
+                <a16:creationId xmlns:a16="http://schemas.microsoft.com/office/drawing/2014/main" id="{5F398E7A-8994-4416-AC2A-4BE81E881A83}"/>
+              </a:ext>
+            </a:extLst>
+          </p:cNvPr>
+          <p:cNvGrpSpPr/>
+          <p:nvPr/>
+        </p:nvGrpSpPr>
+        <p:grpSpPr>
+          <a:xfrm>
+            <a:off x="7573889" y="1723929"/>
+            <a:ext cx="3396976" cy="2284367"/>
+            <a:chOff x="1581773" y="1310504"/>
+            <a:chExt cx="3396976" cy="2284367"/>
+          </a:xfrm>
+        </p:grpSpPr>
+        <p:sp>
+          <p:nvSpPr>
+            <p:cNvPr id="3" name="四角形: 角を丸くする 2">
+              <a:extLst>
+                <a:ext uri="{FF2B5EF4-FFF2-40B4-BE49-F238E27FC236}">
+                  <a16:creationId xmlns:a16="http://schemas.microsoft.com/office/drawing/2014/main" id="{57D09821-EE4D-4551-8D4A-F7910BCA52D8}"/>
+                </a:ext>
+              </a:extLst>
+            </p:cNvPr>
+            <p:cNvSpPr/>
+            <p:nvPr/>
+          </p:nvSpPr>
+          <p:spPr>
+            <a:xfrm>
+              <a:off x="1581773" y="1310504"/>
+              <a:ext cx="3396976" cy="1019175"/>
+            </a:xfrm>
+            <a:prstGeom prst="roundRect">
+              <a:avLst>
+                <a:gd name="adj" fmla="val 50000"/>
+              </a:avLst>
+            </a:prstGeom>
+            <a:noFill/>
+            <a:ln w="127000">
+              <a:noFill/>
+            </a:ln>
+          </p:spPr>
+          <p:style>
+            <a:lnRef idx="2">
+              <a:schemeClr val="accent1">
+                <a:shade val="50000"/>
+              </a:schemeClr>
+            </a:lnRef>
+            <a:fillRef idx="1">
+              <a:schemeClr val="accent1"/>
+            </a:fillRef>
+            <a:effectRef idx="0">
+              <a:schemeClr val="accent1"/>
+            </a:effectRef>
+            <a:fontRef idx="minor">
+              <a:schemeClr val="lt1"/>
+            </a:fontRef>
+          </p:style>
+          <p:txBody>
+            <a:bodyPr rtlCol="0" anchor="ctr"/>
+            <a:lstStyle/>
+            <a:p>
+              <a:pPr algn="ctr"/>
+              <a:r>
+                <a:rPr kumimoji="1" lang="en-US" altLang="ja-JP" sz="6600" b="1" dirty="0"/>
+                <a:t>MEMO</a:t>
+              </a:r>
+              <a:endParaRPr kumimoji="1" lang="ja-JP" altLang="en-US" sz="6600" b="1" dirty="0"/>
+            </a:p>
+          </p:txBody>
+        </p:sp>
+        <p:sp>
+          <p:nvSpPr>
+            <p:cNvPr id="5" name="四角形: 角を丸くする 4">
+              <a:extLst>
+                <a:ext uri="{FF2B5EF4-FFF2-40B4-BE49-F238E27FC236}">
+                  <a16:creationId xmlns:a16="http://schemas.microsoft.com/office/drawing/2014/main" id="{26EF3C13-66ED-4C48-95E7-F9562687B177}"/>
+                </a:ext>
+              </a:extLst>
+            </p:cNvPr>
+            <p:cNvSpPr/>
+            <p:nvPr/>
+          </p:nvSpPr>
+          <p:spPr>
+            <a:xfrm>
+              <a:off x="2108088" y="2329679"/>
+              <a:ext cx="2336889" cy="268200"/>
+            </a:xfrm>
+            <a:prstGeom prst="roundRect">
+              <a:avLst>
+                <a:gd name="adj" fmla="val 50000"/>
+              </a:avLst>
+            </a:prstGeom>
+            <a:solidFill>
+              <a:schemeClr val="tx1"/>
+            </a:solidFill>
+            <a:ln>
+              <a:noFill/>
+            </a:ln>
+          </p:spPr>
+          <p:style>
+            <a:lnRef idx="2">
+              <a:schemeClr val="accent1">
+                <a:shade val="50000"/>
+              </a:schemeClr>
+            </a:lnRef>
+            <a:fillRef idx="1">
+              <a:schemeClr val="accent1"/>
+            </a:fillRef>
+            <a:effectRef idx="0">
+              <a:schemeClr val="accent1"/>
+            </a:effectRef>
+            <a:fontRef idx="minor">
+              <a:schemeClr val="lt1"/>
+            </a:fontRef>
+          </p:style>
+          <p:txBody>
+            <a:bodyPr rtlCol="0" anchor="ctr"/>
+            <a:lstStyle/>
+            <a:p>
+              <a:pPr algn="ctr"/>
+              <a:endParaRPr kumimoji="1" lang="ja-JP" altLang="en-US"/>
+            </a:p>
+          </p:txBody>
+        </p:sp>
+        <p:sp>
+          <p:nvSpPr>
+            <p:cNvPr id="11" name="四角形: 角を丸くする 10">
+              <a:extLst>
+                <a:ext uri="{FF2B5EF4-FFF2-40B4-BE49-F238E27FC236}">
+                  <a16:creationId xmlns:a16="http://schemas.microsoft.com/office/drawing/2014/main" id="{2497FF4B-189F-4CC6-9F6E-BFD01FF516D6}"/>
+                </a:ext>
+              </a:extLst>
+            </p:cNvPr>
+            <p:cNvSpPr/>
+            <p:nvPr/>
+          </p:nvSpPr>
+          <p:spPr>
+            <a:xfrm>
+              <a:off x="2120777" y="2828175"/>
+              <a:ext cx="2336889" cy="268200"/>
+            </a:xfrm>
+            <a:prstGeom prst="roundRect">
+              <a:avLst>
+                <a:gd name="adj" fmla="val 50000"/>
+              </a:avLst>
+            </a:prstGeom>
+            <a:solidFill>
+              <a:schemeClr val="tx1"/>
+            </a:solidFill>
+            <a:ln>
+              <a:noFill/>
+            </a:ln>
+          </p:spPr>
+          <p:style>
+            <a:lnRef idx="2">
+              <a:schemeClr val="accent1">
+                <a:shade val="50000"/>
+              </a:schemeClr>
+            </a:lnRef>
+            <a:fillRef idx="1">
+              <a:schemeClr val="accent1"/>
+            </a:fillRef>
+            <a:effectRef idx="0">
+              <a:schemeClr val="accent1"/>
+            </a:effectRef>
+            <a:fontRef idx="minor">
+              <a:schemeClr val="lt1"/>
+            </a:fontRef>
+          </p:style>
+          <p:txBody>
+            <a:bodyPr rtlCol="0" anchor="ctr"/>
+            <a:lstStyle/>
+            <a:p>
+              <a:pPr algn="ctr"/>
+              <a:endParaRPr kumimoji="1" lang="ja-JP" altLang="en-US"/>
+            </a:p>
+          </p:txBody>
+        </p:sp>
+        <p:sp>
+          <p:nvSpPr>
+            <p:cNvPr id="12" name="四角形: 角を丸くする 11">
+              <a:extLst>
+                <a:ext uri="{FF2B5EF4-FFF2-40B4-BE49-F238E27FC236}">
+                  <a16:creationId xmlns:a16="http://schemas.microsoft.com/office/drawing/2014/main" id="{F480C788-4115-489B-A1A1-75DD41D93735}"/>
+                </a:ext>
+              </a:extLst>
+            </p:cNvPr>
+            <p:cNvSpPr/>
+            <p:nvPr/>
+          </p:nvSpPr>
+          <p:spPr>
+            <a:xfrm>
+              <a:off x="2120777" y="3326671"/>
+              <a:ext cx="2336889" cy="268200"/>
+            </a:xfrm>
+            <a:prstGeom prst="roundRect">
+              <a:avLst>
+                <a:gd name="adj" fmla="val 50000"/>
+              </a:avLst>
+            </a:prstGeom>
+            <a:solidFill>
+              <a:schemeClr val="tx1"/>
+            </a:solidFill>
+            <a:ln>
+              <a:noFill/>
+            </a:ln>
+          </p:spPr>
+          <p:style>
+            <a:lnRef idx="2">
+              <a:schemeClr val="accent1">
+                <a:shade val="50000"/>
+              </a:schemeClr>
+            </a:lnRef>
+            <a:fillRef idx="1">
+              <a:schemeClr val="accent1"/>
+            </a:fillRef>
+            <a:effectRef idx="0">
+              <a:schemeClr val="accent1"/>
+            </a:effectRef>
+            <a:fontRef idx="minor">
+              <a:schemeClr val="lt1"/>
+            </a:fontRef>
+          </p:style>
+          <p:txBody>
+            <a:bodyPr rtlCol="0" anchor="ctr"/>
+            <a:lstStyle/>
+            <a:p>
+              <a:pPr algn="ctr"/>
+              <a:endParaRPr kumimoji="1" lang="ja-JP" altLang="en-US"/>
+            </a:p>
+          </p:txBody>
+        </p:sp>
+      </p:grpSp>
+    </p:spTree>
+    <p:extLst>
+      <p:ext uri="{BB962C8B-B14F-4D97-AF65-F5344CB8AC3E}">
+        <p14:creationId xmlns:p14="http://schemas.microsoft.com/office/powerpoint/2010/main" val="1051524161"/>
+      </p:ext>
+    </p:extLst>
+  </p:cSld>
+  <p:clrMapOvr>
+    <a:masterClrMapping/>
+  </p:clrMapOvr>
+</p:sld>
+</file>
+
+<file path=ppt/slides/slide31.xml><?xml version="1.0" encoding="utf-8"?>
 <p:sld xmlns:a="http://schemas.openxmlformats.org/drawingml/2006/main" xmlns:r="http://schemas.openxmlformats.org/officeDocument/2006/relationships" xmlns:p="http://schemas.openxmlformats.org/presentationml/2006/main">
   <p:cSld>
     <p:spTree>
@@ -19556,7 +20158,7 @@
 </p:sld>
 </file>
 
-<file path=ppt/slides/slide31.xml><?xml version="1.0" encoding="utf-8"?>
+<file path=ppt/slides/slide32.xml><?xml version="1.0" encoding="utf-8"?>
 <p:sld xmlns:a="http://schemas.openxmlformats.org/drawingml/2006/main" xmlns:r="http://schemas.openxmlformats.org/officeDocument/2006/relationships" xmlns:p="http://schemas.openxmlformats.org/presentationml/2006/main">
   <p:cSld>
     <p:spTree>
@@ -21391,7 +21993,7 @@
 </p:sld>
 </file>
 
-<file path=ppt/slides/slide32.xml><?xml version="1.0" encoding="utf-8"?>
+<file path=ppt/slides/slide33.xml><?xml version="1.0" encoding="utf-8"?>
 <p:sld xmlns:a="http://schemas.openxmlformats.org/drawingml/2006/main" xmlns:r="http://schemas.openxmlformats.org/officeDocument/2006/relationships" xmlns:p="http://schemas.openxmlformats.org/presentationml/2006/main">
   <p:cSld>
     <p:bg>
@@ -21481,7 +22083,7 @@
 </p:sld>
 </file>
 
-<file path=ppt/slides/slide33.xml><?xml version="1.0" encoding="utf-8"?>
+<file path=ppt/slides/slide34.xml><?xml version="1.0" encoding="utf-8"?>
 <p:sld xmlns:a="http://schemas.openxmlformats.org/drawingml/2006/main" xmlns:r="http://schemas.openxmlformats.org/officeDocument/2006/relationships" xmlns:p="http://schemas.openxmlformats.org/presentationml/2006/main">
   <p:cSld>
     <p:bg>
@@ -24633,7 +25235,7 @@
 </p:sld>
 </file>
 
-<file path=ppt/slides/slide34.xml><?xml version="1.0" encoding="utf-8"?>
+<file path=ppt/slides/slide35.xml><?xml version="1.0" encoding="utf-8"?>
 <p:sld xmlns:a="http://schemas.openxmlformats.org/drawingml/2006/main" xmlns:r="http://schemas.openxmlformats.org/officeDocument/2006/relationships" xmlns:p="http://schemas.openxmlformats.org/presentationml/2006/main">
   <p:cSld>
     <p:bg>
@@ -25456,7 +26058,7 @@
 </p:sld>
 </file>
 
-<file path=ppt/slides/slide35.xml><?xml version="1.0" encoding="utf-8"?>
+<file path=ppt/slides/slide36.xml><?xml version="1.0" encoding="utf-8"?>
 <p:sld xmlns:a="http://schemas.openxmlformats.org/drawingml/2006/main" xmlns:r="http://schemas.openxmlformats.org/officeDocument/2006/relationships" xmlns:p="http://schemas.openxmlformats.org/presentationml/2006/main">
   <p:cSld>
     <p:bg>
@@ -25763,7 +26365,7 @@
 </p:sld>
 </file>
 
-<file path=ppt/slides/slide36.xml><?xml version="1.0" encoding="utf-8"?>
+<file path=ppt/slides/slide37.xml><?xml version="1.0" encoding="utf-8"?>
 <p:sld xmlns:a="http://schemas.openxmlformats.org/drawingml/2006/main" xmlns:r="http://schemas.openxmlformats.org/officeDocument/2006/relationships" xmlns:p="http://schemas.openxmlformats.org/presentationml/2006/main">
   <p:cSld>
     <p:spTree>
@@ -26077,7 +26679,7 @@
 </p:sld>
 </file>
 
-<file path=ppt/slides/slide37.xml><?xml version="1.0" encoding="utf-8"?>
+<file path=ppt/slides/slide38.xml><?xml version="1.0" encoding="utf-8"?>
 <p:sld xmlns:a="http://schemas.openxmlformats.org/drawingml/2006/main" xmlns:r="http://schemas.openxmlformats.org/officeDocument/2006/relationships" xmlns:p="http://schemas.openxmlformats.org/presentationml/2006/main">
   <p:cSld>
     <p:spTree>
@@ -26522,7 +27124,7 @@
 </p:sld>
 </file>
 
-<file path=ppt/slides/slide38.xml><?xml version="1.0" encoding="utf-8"?>
+<file path=ppt/slides/slide39.xml><?xml version="1.0" encoding="utf-8"?>
 <p:sld xmlns:a="http://schemas.openxmlformats.org/drawingml/2006/main" xmlns:r="http://schemas.openxmlformats.org/officeDocument/2006/relationships" xmlns:p="http://schemas.openxmlformats.org/presentationml/2006/main">
   <p:cSld>
     <p:bg>
@@ -26984,504 +27586,6 @@
     <p:extLst>
       <p:ext uri="{BB962C8B-B14F-4D97-AF65-F5344CB8AC3E}">
         <p14:creationId xmlns:p14="http://schemas.microsoft.com/office/powerpoint/2010/main" val="4074579835"/>
-      </p:ext>
-    </p:extLst>
-  </p:cSld>
-  <p:clrMapOvr>
-    <a:masterClrMapping/>
-  </p:clrMapOvr>
-</p:sld>
-</file>
-
-<file path=ppt/slides/slide39.xml><?xml version="1.0" encoding="utf-8"?>
-<p:sld xmlns:a="http://schemas.openxmlformats.org/drawingml/2006/main" xmlns:r="http://schemas.openxmlformats.org/officeDocument/2006/relationships" xmlns:p="http://schemas.openxmlformats.org/presentationml/2006/main">
-  <p:cSld>
-    <p:spTree>
-      <p:nvGrpSpPr>
-        <p:cNvPr id="1" name=""/>
-        <p:cNvGrpSpPr/>
-        <p:nvPr/>
-      </p:nvGrpSpPr>
-      <p:grpSpPr>
-        <a:xfrm>
-          <a:off x="0" y="0"/>
-          <a:ext cx="0" cy="0"/>
-          <a:chOff x="0" y="0"/>
-          <a:chExt cx="0" cy="0"/>
-        </a:xfrm>
-      </p:grpSpPr>
-      <p:sp>
-        <p:nvSpPr>
-          <p:cNvPr id="2" name="四角形: 対角を切り取る 1">
-            <a:extLst>
-              <a:ext uri="{FF2B5EF4-FFF2-40B4-BE49-F238E27FC236}">
-                <a16:creationId xmlns:a16="http://schemas.microsoft.com/office/drawing/2014/main" id="{D0EC4782-6088-43D1-9027-55BBF7A57C9D}"/>
-              </a:ext>
-            </a:extLst>
-          </p:cNvPr>
-          <p:cNvSpPr/>
-          <p:nvPr/>
-        </p:nvSpPr>
-        <p:spPr>
-          <a:xfrm rot="2700000">
-            <a:off x="887767" y="221942"/>
-            <a:ext cx="2343704" cy="2343704"/>
-          </a:xfrm>
-          <a:prstGeom prst="snip2DiagRect">
-            <a:avLst>
-              <a:gd name="adj1" fmla="val 50000"/>
-              <a:gd name="adj2" fmla="val 0"/>
-            </a:avLst>
-          </a:prstGeom>
-          <a:gradFill>
-            <a:gsLst>
-              <a:gs pos="0">
-                <a:schemeClr val="accent1">
-                  <a:lumMod val="5000"/>
-                  <a:lumOff val="95000"/>
-                </a:schemeClr>
-              </a:gs>
-              <a:gs pos="40000">
-                <a:schemeClr val="tx1">
-                  <a:lumMod val="95000"/>
-                </a:schemeClr>
-              </a:gs>
-              <a:gs pos="62000">
-                <a:schemeClr val="tx1">
-                  <a:lumMod val="95000"/>
-                </a:schemeClr>
-              </a:gs>
-              <a:gs pos="95000">
-                <a:schemeClr val="tx1">
-                  <a:lumMod val="85000"/>
-                </a:schemeClr>
-              </a:gs>
-            </a:gsLst>
-            <a:lin ang="5400000" scaled="1"/>
-          </a:gradFill>
-          <a:ln>
-            <a:noFill/>
-          </a:ln>
-        </p:spPr>
-        <p:style>
-          <a:lnRef idx="2">
-            <a:schemeClr val="accent1">
-              <a:shade val="50000"/>
-            </a:schemeClr>
-          </a:lnRef>
-          <a:fillRef idx="1">
-            <a:schemeClr val="accent1"/>
-          </a:fillRef>
-          <a:effectRef idx="0">
-            <a:schemeClr val="accent1"/>
-          </a:effectRef>
-          <a:fontRef idx="minor">
-            <a:schemeClr val="lt1"/>
-          </a:fontRef>
-        </p:style>
-        <p:txBody>
-          <a:bodyPr rtlCol="0" anchor="ctr"/>
-          <a:lstStyle/>
-          <a:p>
-            <a:pPr algn="ctr"/>
-            <a:endParaRPr kumimoji="1" lang="ja-JP" altLang="en-US"/>
-          </a:p>
-        </p:txBody>
-      </p:sp>
-      <p:sp>
-        <p:nvSpPr>
-          <p:cNvPr id="3" name="四角形: 対角を切り取る 2">
-            <a:extLst>
-              <a:ext uri="{FF2B5EF4-FFF2-40B4-BE49-F238E27FC236}">
-                <a16:creationId xmlns:a16="http://schemas.microsoft.com/office/drawing/2014/main" id="{CA40D7AB-4CDE-46C8-A582-14DF60BDCF80}"/>
-              </a:ext>
-            </a:extLst>
-          </p:cNvPr>
-          <p:cNvSpPr/>
-          <p:nvPr/>
-        </p:nvSpPr>
-        <p:spPr>
-          <a:xfrm>
-            <a:off x="4287915" y="221942"/>
-            <a:ext cx="2343704" cy="2343704"/>
-          </a:xfrm>
-          <a:prstGeom prst="snip2DiagRect">
-            <a:avLst>
-              <a:gd name="adj1" fmla="val 50000"/>
-              <a:gd name="adj2" fmla="val 50000"/>
-            </a:avLst>
-          </a:prstGeom>
-          <a:gradFill>
-            <a:gsLst>
-              <a:gs pos="0">
-                <a:schemeClr val="accent1">
-                  <a:lumMod val="5000"/>
-                  <a:lumOff val="95000"/>
-                </a:schemeClr>
-              </a:gs>
-              <a:gs pos="40000">
-                <a:schemeClr val="tx1">
-                  <a:lumMod val="95000"/>
-                </a:schemeClr>
-              </a:gs>
-              <a:gs pos="62000">
-                <a:schemeClr val="tx1">
-                  <a:lumMod val="95000"/>
-                </a:schemeClr>
-              </a:gs>
-              <a:gs pos="95000">
-                <a:schemeClr val="tx1">
-                  <a:lumMod val="85000"/>
-                </a:schemeClr>
-              </a:gs>
-            </a:gsLst>
-            <a:lin ang="5400000" scaled="1"/>
-          </a:gradFill>
-          <a:ln>
-            <a:noFill/>
-          </a:ln>
-        </p:spPr>
-        <p:style>
-          <a:lnRef idx="2">
-            <a:schemeClr val="accent1">
-              <a:shade val="50000"/>
-            </a:schemeClr>
-          </a:lnRef>
-          <a:fillRef idx="1">
-            <a:schemeClr val="accent1"/>
-          </a:fillRef>
-          <a:effectRef idx="0">
-            <a:schemeClr val="accent1"/>
-          </a:effectRef>
-          <a:fontRef idx="minor">
-            <a:schemeClr val="lt1"/>
-          </a:fontRef>
-        </p:style>
-        <p:txBody>
-          <a:bodyPr rtlCol="0" anchor="ctr"/>
-          <a:lstStyle/>
-          <a:p>
-            <a:pPr algn="ctr"/>
-            <a:endParaRPr kumimoji="1" lang="ja-JP" altLang="en-US"/>
-          </a:p>
-        </p:txBody>
-      </p:sp>
-      <p:sp>
-        <p:nvSpPr>
-          <p:cNvPr id="5" name="四角形: 対角を切り取る 4">
-            <a:extLst>
-              <a:ext uri="{FF2B5EF4-FFF2-40B4-BE49-F238E27FC236}">
-                <a16:creationId xmlns:a16="http://schemas.microsoft.com/office/drawing/2014/main" id="{6DBA6DFB-5D54-46D7-B3C8-C1C6B47E4765}"/>
-              </a:ext>
-            </a:extLst>
-          </p:cNvPr>
-          <p:cNvSpPr/>
-          <p:nvPr/>
-        </p:nvSpPr>
-        <p:spPr>
-          <a:xfrm rot="2700000">
-            <a:off x="8257712" y="356586"/>
-            <a:ext cx="2343704" cy="2343704"/>
-          </a:xfrm>
-          <a:prstGeom prst="snip2DiagRect">
-            <a:avLst>
-              <a:gd name="adj1" fmla="val 35227"/>
-              <a:gd name="adj2" fmla="val 20455"/>
-            </a:avLst>
-          </a:prstGeom>
-          <a:gradFill>
-            <a:gsLst>
-              <a:gs pos="0">
-                <a:schemeClr val="accent1">
-                  <a:lumMod val="5000"/>
-                  <a:lumOff val="95000"/>
-                </a:schemeClr>
-              </a:gs>
-              <a:gs pos="40000">
-                <a:schemeClr val="tx1">
-                  <a:lumMod val="95000"/>
-                </a:schemeClr>
-              </a:gs>
-              <a:gs pos="62000">
-                <a:schemeClr val="tx1">
-                  <a:lumMod val="95000"/>
-                </a:schemeClr>
-              </a:gs>
-              <a:gs pos="95000">
-                <a:schemeClr val="tx1">
-                  <a:lumMod val="85000"/>
-                </a:schemeClr>
-              </a:gs>
-            </a:gsLst>
-            <a:lin ang="5400000" scaled="1"/>
-          </a:gradFill>
-          <a:ln>
-            <a:noFill/>
-          </a:ln>
-        </p:spPr>
-        <p:style>
-          <a:lnRef idx="2">
-            <a:schemeClr val="accent1">
-              <a:shade val="50000"/>
-            </a:schemeClr>
-          </a:lnRef>
-          <a:fillRef idx="1">
-            <a:schemeClr val="accent1"/>
-          </a:fillRef>
-          <a:effectRef idx="0">
-            <a:schemeClr val="accent1"/>
-          </a:effectRef>
-          <a:fontRef idx="minor">
-            <a:schemeClr val="lt1"/>
-          </a:fontRef>
-        </p:style>
-        <p:txBody>
-          <a:bodyPr rtlCol="0" anchor="ctr"/>
-          <a:lstStyle/>
-          <a:p>
-            <a:pPr algn="ctr"/>
-            <a:endParaRPr kumimoji="1" lang="ja-JP" altLang="en-US"/>
-          </a:p>
-        </p:txBody>
-      </p:sp>
-      <p:sp>
-        <p:nvSpPr>
-          <p:cNvPr id="6" name="四角形: 対角を丸める 5">
-            <a:extLst>
-              <a:ext uri="{FF2B5EF4-FFF2-40B4-BE49-F238E27FC236}">
-                <a16:creationId xmlns:a16="http://schemas.microsoft.com/office/drawing/2014/main" id="{4D518B83-1656-4426-87BB-CA9B0BFCDDD9}"/>
-              </a:ext>
-            </a:extLst>
-          </p:cNvPr>
-          <p:cNvSpPr/>
-          <p:nvPr/>
-        </p:nvSpPr>
-        <p:spPr>
-          <a:xfrm>
-            <a:off x="772357" y="3429000"/>
-            <a:ext cx="2441359" cy="2441359"/>
-          </a:xfrm>
-          <a:prstGeom prst="round2DiagRect">
-            <a:avLst>
-              <a:gd name="adj1" fmla="val 40909"/>
-              <a:gd name="adj2" fmla="val 39272"/>
-            </a:avLst>
-          </a:prstGeom>
-          <a:gradFill>
-            <a:gsLst>
-              <a:gs pos="0">
-                <a:schemeClr val="accent1">
-                  <a:lumMod val="5000"/>
-                  <a:lumOff val="95000"/>
-                </a:schemeClr>
-              </a:gs>
-              <a:gs pos="40000">
-                <a:schemeClr val="tx1">
-                  <a:lumMod val="95000"/>
-                </a:schemeClr>
-              </a:gs>
-              <a:gs pos="62000">
-                <a:schemeClr val="tx1">
-                  <a:lumMod val="95000"/>
-                </a:schemeClr>
-              </a:gs>
-              <a:gs pos="95000">
-                <a:schemeClr val="tx1">
-                  <a:lumMod val="85000"/>
-                </a:schemeClr>
-              </a:gs>
-            </a:gsLst>
-            <a:lin ang="5400000" scaled="1"/>
-          </a:gradFill>
-          <a:ln>
-            <a:noFill/>
-          </a:ln>
-        </p:spPr>
-        <p:style>
-          <a:lnRef idx="2">
-            <a:schemeClr val="accent1">
-              <a:shade val="50000"/>
-            </a:schemeClr>
-          </a:lnRef>
-          <a:fillRef idx="1">
-            <a:schemeClr val="accent1"/>
-          </a:fillRef>
-          <a:effectRef idx="0">
-            <a:schemeClr val="accent1"/>
-          </a:effectRef>
-          <a:fontRef idx="minor">
-            <a:schemeClr val="lt1"/>
-          </a:fontRef>
-        </p:style>
-        <p:txBody>
-          <a:bodyPr rtlCol="0" anchor="ctr"/>
-          <a:lstStyle/>
-          <a:p>
-            <a:pPr algn="ctr"/>
-            <a:endParaRPr kumimoji="1" lang="ja-JP" altLang="en-US"/>
-          </a:p>
-        </p:txBody>
-      </p:sp>
-      <p:sp>
-        <p:nvSpPr>
-          <p:cNvPr id="7" name="四角形: 1 つの角を切り取り 1 つの角を丸める 6">
-            <a:extLst>
-              <a:ext uri="{FF2B5EF4-FFF2-40B4-BE49-F238E27FC236}">
-                <a16:creationId xmlns:a16="http://schemas.microsoft.com/office/drawing/2014/main" id="{5C155BC5-22C7-4276-B0C6-32F9D9B08534}"/>
-              </a:ext>
-            </a:extLst>
-          </p:cNvPr>
-          <p:cNvSpPr/>
-          <p:nvPr/>
-        </p:nvSpPr>
-        <p:spPr>
-          <a:xfrm>
-            <a:off x="4225771" y="3526654"/>
-            <a:ext cx="2246050" cy="2246050"/>
-          </a:xfrm>
-          <a:prstGeom prst="snipRoundRect">
-            <a:avLst>
-              <a:gd name="adj1" fmla="val 50000"/>
-              <a:gd name="adj2" fmla="val 50000"/>
-            </a:avLst>
-          </a:prstGeom>
-          <a:gradFill>
-            <a:gsLst>
-              <a:gs pos="0">
-                <a:schemeClr val="accent1">
-                  <a:lumMod val="5000"/>
-                  <a:lumOff val="95000"/>
-                </a:schemeClr>
-              </a:gs>
-              <a:gs pos="40000">
-                <a:schemeClr val="tx1">
-                  <a:lumMod val="95000"/>
-                </a:schemeClr>
-              </a:gs>
-              <a:gs pos="62000">
-                <a:schemeClr val="tx1">
-                  <a:lumMod val="95000"/>
-                </a:schemeClr>
-              </a:gs>
-              <a:gs pos="95000">
-                <a:schemeClr val="tx1">
-                  <a:lumMod val="85000"/>
-                </a:schemeClr>
-              </a:gs>
-            </a:gsLst>
-            <a:lin ang="5400000" scaled="1"/>
-          </a:gradFill>
-          <a:ln>
-            <a:noFill/>
-          </a:ln>
-        </p:spPr>
-        <p:style>
-          <a:lnRef idx="2">
-            <a:schemeClr val="accent1">
-              <a:shade val="50000"/>
-            </a:schemeClr>
-          </a:lnRef>
-          <a:fillRef idx="1">
-            <a:schemeClr val="accent1"/>
-          </a:fillRef>
-          <a:effectRef idx="0">
-            <a:schemeClr val="accent1"/>
-          </a:effectRef>
-          <a:fontRef idx="minor">
-            <a:schemeClr val="lt1"/>
-          </a:fontRef>
-        </p:style>
-        <p:txBody>
-          <a:bodyPr rtlCol="0" anchor="ctr"/>
-          <a:lstStyle/>
-          <a:p>
-            <a:pPr algn="ctr"/>
-            <a:endParaRPr kumimoji="1" lang="ja-JP" altLang="en-US"/>
-          </a:p>
-        </p:txBody>
-      </p:sp>
-      <p:sp>
-        <p:nvSpPr>
-          <p:cNvPr id="8" name="四角形: 対角を切り取る 7">
-            <a:extLst>
-              <a:ext uri="{FF2B5EF4-FFF2-40B4-BE49-F238E27FC236}">
-                <a16:creationId xmlns:a16="http://schemas.microsoft.com/office/drawing/2014/main" id="{4F431F78-F624-42F4-93E3-DE06A8215993}"/>
-              </a:ext>
-            </a:extLst>
-          </p:cNvPr>
-          <p:cNvSpPr/>
-          <p:nvPr/>
-        </p:nvSpPr>
-        <p:spPr>
-          <a:xfrm rot="2700000">
-            <a:off x="8160059" y="3671085"/>
-            <a:ext cx="2343704" cy="2343704"/>
-          </a:xfrm>
-          <a:prstGeom prst="snip2DiagRect">
-            <a:avLst>
-              <a:gd name="adj1" fmla="val 50000"/>
-              <a:gd name="adj2" fmla="val 15267"/>
-            </a:avLst>
-          </a:prstGeom>
-          <a:gradFill>
-            <a:gsLst>
-              <a:gs pos="0">
-                <a:schemeClr val="accent1">
-                  <a:lumMod val="5000"/>
-                  <a:lumOff val="95000"/>
-                </a:schemeClr>
-              </a:gs>
-              <a:gs pos="40000">
-                <a:schemeClr val="tx1">
-                  <a:lumMod val="95000"/>
-                </a:schemeClr>
-              </a:gs>
-              <a:gs pos="62000">
-                <a:schemeClr val="tx1">
-                  <a:lumMod val="95000"/>
-                </a:schemeClr>
-              </a:gs>
-              <a:gs pos="95000">
-                <a:schemeClr val="tx1">
-                  <a:lumMod val="85000"/>
-                </a:schemeClr>
-              </a:gs>
-            </a:gsLst>
-            <a:lin ang="5400000" scaled="1"/>
-          </a:gradFill>
-          <a:ln>
-            <a:noFill/>
-          </a:ln>
-        </p:spPr>
-        <p:style>
-          <a:lnRef idx="2">
-            <a:schemeClr val="accent1">
-              <a:shade val="50000"/>
-            </a:schemeClr>
-          </a:lnRef>
-          <a:fillRef idx="1">
-            <a:schemeClr val="accent1"/>
-          </a:fillRef>
-          <a:effectRef idx="0">
-            <a:schemeClr val="accent1"/>
-          </a:effectRef>
-          <a:fontRef idx="minor">
-            <a:schemeClr val="lt1"/>
-          </a:fontRef>
-        </p:style>
-        <p:txBody>
-          <a:bodyPr rtlCol="0" anchor="ctr"/>
-          <a:lstStyle/>
-          <a:p>
-            <a:pPr algn="ctr"/>
-            <a:endParaRPr kumimoji="1" lang="ja-JP" altLang="en-US"/>
-          </a:p>
-        </p:txBody>
-      </p:sp>
-    </p:spTree>
-    <p:extLst>
-      <p:ext uri="{BB962C8B-B14F-4D97-AF65-F5344CB8AC3E}">
-        <p14:creationId xmlns:p14="http://schemas.microsoft.com/office/powerpoint/2010/main" val="2930997555"/>
       </p:ext>
     </p:extLst>
   </p:cSld>
@@ -28908,6 +29012,504 @@
 <file path=ppt/slides/slide40.xml><?xml version="1.0" encoding="utf-8"?>
 <p:sld xmlns:a="http://schemas.openxmlformats.org/drawingml/2006/main" xmlns:r="http://schemas.openxmlformats.org/officeDocument/2006/relationships" xmlns:p="http://schemas.openxmlformats.org/presentationml/2006/main">
   <p:cSld>
+    <p:spTree>
+      <p:nvGrpSpPr>
+        <p:cNvPr id="1" name=""/>
+        <p:cNvGrpSpPr/>
+        <p:nvPr/>
+      </p:nvGrpSpPr>
+      <p:grpSpPr>
+        <a:xfrm>
+          <a:off x="0" y="0"/>
+          <a:ext cx="0" cy="0"/>
+          <a:chOff x="0" y="0"/>
+          <a:chExt cx="0" cy="0"/>
+        </a:xfrm>
+      </p:grpSpPr>
+      <p:sp>
+        <p:nvSpPr>
+          <p:cNvPr id="2" name="四角形: 対角を切り取る 1">
+            <a:extLst>
+              <a:ext uri="{FF2B5EF4-FFF2-40B4-BE49-F238E27FC236}">
+                <a16:creationId xmlns:a16="http://schemas.microsoft.com/office/drawing/2014/main" id="{D0EC4782-6088-43D1-9027-55BBF7A57C9D}"/>
+              </a:ext>
+            </a:extLst>
+          </p:cNvPr>
+          <p:cNvSpPr/>
+          <p:nvPr/>
+        </p:nvSpPr>
+        <p:spPr>
+          <a:xfrm rot="2700000">
+            <a:off x="887767" y="221942"/>
+            <a:ext cx="2343704" cy="2343704"/>
+          </a:xfrm>
+          <a:prstGeom prst="snip2DiagRect">
+            <a:avLst>
+              <a:gd name="adj1" fmla="val 50000"/>
+              <a:gd name="adj2" fmla="val 0"/>
+            </a:avLst>
+          </a:prstGeom>
+          <a:gradFill>
+            <a:gsLst>
+              <a:gs pos="0">
+                <a:schemeClr val="accent1">
+                  <a:lumMod val="5000"/>
+                  <a:lumOff val="95000"/>
+                </a:schemeClr>
+              </a:gs>
+              <a:gs pos="40000">
+                <a:schemeClr val="tx1">
+                  <a:lumMod val="95000"/>
+                </a:schemeClr>
+              </a:gs>
+              <a:gs pos="62000">
+                <a:schemeClr val="tx1">
+                  <a:lumMod val="95000"/>
+                </a:schemeClr>
+              </a:gs>
+              <a:gs pos="95000">
+                <a:schemeClr val="tx1">
+                  <a:lumMod val="85000"/>
+                </a:schemeClr>
+              </a:gs>
+            </a:gsLst>
+            <a:lin ang="5400000" scaled="1"/>
+          </a:gradFill>
+          <a:ln>
+            <a:noFill/>
+          </a:ln>
+        </p:spPr>
+        <p:style>
+          <a:lnRef idx="2">
+            <a:schemeClr val="accent1">
+              <a:shade val="50000"/>
+            </a:schemeClr>
+          </a:lnRef>
+          <a:fillRef idx="1">
+            <a:schemeClr val="accent1"/>
+          </a:fillRef>
+          <a:effectRef idx="0">
+            <a:schemeClr val="accent1"/>
+          </a:effectRef>
+          <a:fontRef idx="minor">
+            <a:schemeClr val="lt1"/>
+          </a:fontRef>
+        </p:style>
+        <p:txBody>
+          <a:bodyPr rtlCol="0" anchor="ctr"/>
+          <a:lstStyle/>
+          <a:p>
+            <a:pPr algn="ctr"/>
+            <a:endParaRPr kumimoji="1" lang="ja-JP" altLang="en-US"/>
+          </a:p>
+        </p:txBody>
+      </p:sp>
+      <p:sp>
+        <p:nvSpPr>
+          <p:cNvPr id="3" name="四角形: 対角を切り取る 2">
+            <a:extLst>
+              <a:ext uri="{FF2B5EF4-FFF2-40B4-BE49-F238E27FC236}">
+                <a16:creationId xmlns:a16="http://schemas.microsoft.com/office/drawing/2014/main" id="{CA40D7AB-4CDE-46C8-A582-14DF60BDCF80}"/>
+              </a:ext>
+            </a:extLst>
+          </p:cNvPr>
+          <p:cNvSpPr/>
+          <p:nvPr/>
+        </p:nvSpPr>
+        <p:spPr>
+          <a:xfrm>
+            <a:off x="4287915" y="221942"/>
+            <a:ext cx="2343704" cy="2343704"/>
+          </a:xfrm>
+          <a:prstGeom prst="snip2DiagRect">
+            <a:avLst>
+              <a:gd name="adj1" fmla="val 50000"/>
+              <a:gd name="adj2" fmla="val 50000"/>
+            </a:avLst>
+          </a:prstGeom>
+          <a:gradFill>
+            <a:gsLst>
+              <a:gs pos="0">
+                <a:schemeClr val="accent1">
+                  <a:lumMod val="5000"/>
+                  <a:lumOff val="95000"/>
+                </a:schemeClr>
+              </a:gs>
+              <a:gs pos="40000">
+                <a:schemeClr val="tx1">
+                  <a:lumMod val="95000"/>
+                </a:schemeClr>
+              </a:gs>
+              <a:gs pos="62000">
+                <a:schemeClr val="tx1">
+                  <a:lumMod val="95000"/>
+                </a:schemeClr>
+              </a:gs>
+              <a:gs pos="95000">
+                <a:schemeClr val="tx1">
+                  <a:lumMod val="85000"/>
+                </a:schemeClr>
+              </a:gs>
+            </a:gsLst>
+            <a:lin ang="5400000" scaled="1"/>
+          </a:gradFill>
+          <a:ln>
+            <a:noFill/>
+          </a:ln>
+        </p:spPr>
+        <p:style>
+          <a:lnRef idx="2">
+            <a:schemeClr val="accent1">
+              <a:shade val="50000"/>
+            </a:schemeClr>
+          </a:lnRef>
+          <a:fillRef idx="1">
+            <a:schemeClr val="accent1"/>
+          </a:fillRef>
+          <a:effectRef idx="0">
+            <a:schemeClr val="accent1"/>
+          </a:effectRef>
+          <a:fontRef idx="minor">
+            <a:schemeClr val="lt1"/>
+          </a:fontRef>
+        </p:style>
+        <p:txBody>
+          <a:bodyPr rtlCol="0" anchor="ctr"/>
+          <a:lstStyle/>
+          <a:p>
+            <a:pPr algn="ctr"/>
+            <a:endParaRPr kumimoji="1" lang="ja-JP" altLang="en-US"/>
+          </a:p>
+        </p:txBody>
+      </p:sp>
+      <p:sp>
+        <p:nvSpPr>
+          <p:cNvPr id="5" name="四角形: 対角を切り取る 4">
+            <a:extLst>
+              <a:ext uri="{FF2B5EF4-FFF2-40B4-BE49-F238E27FC236}">
+                <a16:creationId xmlns:a16="http://schemas.microsoft.com/office/drawing/2014/main" id="{6DBA6DFB-5D54-46D7-B3C8-C1C6B47E4765}"/>
+              </a:ext>
+            </a:extLst>
+          </p:cNvPr>
+          <p:cNvSpPr/>
+          <p:nvPr/>
+        </p:nvSpPr>
+        <p:spPr>
+          <a:xfrm rot="2700000">
+            <a:off x="8257712" y="356586"/>
+            <a:ext cx="2343704" cy="2343704"/>
+          </a:xfrm>
+          <a:prstGeom prst="snip2DiagRect">
+            <a:avLst>
+              <a:gd name="adj1" fmla="val 35227"/>
+              <a:gd name="adj2" fmla="val 20455"/>
+            </a:avLst>
+          </a:prstGeom>
+          <a:gradFill>
+            <a:gsLst>
+              <a:gs pos="0">
+                <a:schemeClr val="accent1">
+                  <a:lumMod val="5000"/>
+                  <a:lumOff val="95000"/>
+                </a:schemeClr>
+              </a:gs>
+              <a:gs pos="40000">
+                <a:schemeClr val="tx1">
+                  <a:lumMod val="95000"/>
+                </a:schemeClr>
+              </a:gs>
+              <a:gs pos="62000">
+                <a:schemeClr val="tx1">
+                  <a:lumMod val="95000"/>
+                </a:schemeClr>
+              </a:gs>
+              <a:gs pos="95000">
+                <a:schemeClr val="tx1">
+                  <a:lumMod val="85000"/>
+                </a:schemeClr>
+              </a:gs>
+            </a:gsLst>
+            <a:lin ang="5400000" scaled="1"/>
+          </a:gradFill>
+          <a:ln>
+            <a:noFill/>
+          </a:ln>
+        </p:spPr>
+        <p:style>
+          <a:lnRef idx="2">
+            <a:schemeClr val="accent1">
+              <a:shade val="50000"/>
+            </a:schemeClr>
+          </a:lnRef>
+          <a:fillRef idx="1">
+            <a:schemeClr val="accent1"/>
+          </a:fillRef>
+          <a:effectRef idx="0">
+            <a:schemeClr val="accent1"/>
+          </a:effectRef>
+          <a:fontRef idx="minor">
+            <a:schemeClr val="lt1"/>
+          </a:fontRef>
+        </p:style>
+        <p:txBody>
+          <a:bodyPr rtlCol="0" anchor="ctr"/>
+          <a:lstStyle/>
+          <a:p>
+            <a:pPr algn="ctr"/>
+            <a:endParaRPr kumimoji="1" lang="ja-JP" altLang="en-US"/>
+          </a:p>
+        </p:txBody>
+      </p:sp>
+      <p:sp>
+        <p:nvSpPr>
+          <p:cNvPr id="6" name="四角形: 対角を丸める 5">
+            <a:extLst>
+              <a:ext uri="{FF2B5EF4-FFF2-40B4-BE49-F238E27FC236}">
+                <a16:creationId xmlns:a16="http://schemas.microsoft.com/office/drawing/2014/main" id="{4D518B83-1656-4426-87BB-CA9B0BFCDDD9}"/>
+              </a:ext>
+            </a:extLst>
+          </p:cNvPr>
+          <p:cNvSpPr/>
+          <p:nvPr/>
+        </p:nvSpPr>
+        <p:spPr>
+          <a:xfrm>
+            <a:off x="772357" y="3429000"/>
+            <a:ext cx="2441359" cy="2441359"/>
+          </a:xfrm>
+          <a:prstGeom prst="round2DiagRect">
+            <a:avLst>
+              <a:gd name="adj1" fmla="val 40909"/>
+              <a:gd name="adj2" fmla="val 39272"/>
+            </a:avLst>
+          </a:prstGeom>
+          <a:gradFill>
+            <a:gsLst>
+              <a:gs pos="0">
+                <a:schemeClr val="accent1">
+                  <a:lumMod val="5000"/>
+                  <a:lumOff val="95000"/>
+                </a:schemeClr>
+              </a:gs>
+              <a:gs pos="40000">
+                <a:schemeClr val="tx1">
+                  <a:lumMod val="95000"/>
+                </a:schemeClr>
+              </a:gs>
+              <a:gs pos="62000">
+                <a:schemeClr val="tx1">
+                  <a:lumMod val="95000"/>
+                </a:schemeClr>
+              </a:gs>
+              <a:gs pos="95000">
+                <a:schemeClr val="tx1">
+                  <a:lumMod val="85000"/>
+                </a:schemeClr>
+              </a:gs>
+            </a:gsLst>
+            <a:lin ang="5400000" scaled="1"/>
+          </a:gradFill>
+          <a:ln>
+            <a:noFill/>
+          </a:ln>
+        </p:spPr>
+        <p:style>
+          <a:lnRef idx="2">
+            <a:schemeClr val="accent1">
+              <a:shade val="50000"/>
+            </a:schemeClr>
+          </a:lnRef>
+          <a:fillRef idx="1">
+            <a:schemeClr val="accent1"/>
+          </a:fillRef>
+          <a:effectRef idx="0">
+            <a:schemeClr val="accent1"/>
+          </a:effectRef>
+          <a:fontRef idx="minor">
+            <a:schemeClr val="lt1"/>
+          </a:fontRef>
+        </p:style>
+        <p:txBody>
+          <a:bodyPr rtlCol="0" anchor="ctr"/>
+          <a:lstStyle/>
+          <a:p>
+            <a:pPr algn="ctr"/>
+            <a:endParaRPr kumimoji="1" lang="ja-JP" altLang="en-US"/>
+          </a:p>
+        </p:txBody>
+      </p:sp>
+      <p:sp>
+        <p:nvSpPr>
+          <p:cNvPr id="7" name="四角形: 1 つの角を切り取り 1 つの角を丸める 6">
+            <a:extLst>
+              <a:ext uri="{FF2B5EF4-FFF2-40B4-BE49-F238E27FC236}">
+                <a16:creationId xmlns:a16="http://schemas.microsoft.com/office/drawing/2014/main" id="{5C155BC5-22C7-4276-B0C6-32F9D9B08534}"/>
+              </a:ext>
+            </a:extLst>
+          </p:cNvPr>
+          <p:cNvSpPr/>
+          <p:nvPr/>
+        </p:nvSpPr>
+        <p:spPr>
+          <a:xfrm>
+            <a:off x="4225771" y="3526654"/>
+            <a:ext cx="2246050" cy="2246050"/>
+          </a:xfrm>
+          <a:prstGeom prst="snipRoundRect">
+            <a:avLst>
+              <a:gd name="adj1" fmla="val 50000"/>
+              <a:gd name="adj2" fmla="val 50000"/>
+            </a:avLst>
+          </a:prstGeom>
+          <a:gradFill>
+            <a:gsLst>
+              <a:gs pos="0">
+                <a:schemeClr val="accent1">
+                  <a:lumMod val="5000"/>
+                  <a:lumOff val="95000"/>
+                </a:schemeClr>
+              </a:gs>
+              <a:gs pos="40000">
+                <a:schemeClr val="tx1">
+                  <a:lumMod val="95000"/>
+                </a:schemeClr>
+              </a:gs>
+              <a:gs pos="62000">
+                <a:schemeClr val="tx1">
+                  <a:lumMod val="95000"/>
+                </a:schemeClr>
+              </a:gs>
+              <a:gs pos="95000">
+                <a:schemeClr val="tx1">
+                  <a:lumMod val="85000"/>
+                </a:schemeClr>
+              </a:gs>
+            </a:gsLst>
+            <a:lin ang="5400000" scaled="1"/>
+          </a:gradFill>
+          <a:ln>
+            <a:noFill/>
+          </a:ln>
+        </p:spPr>
+        <p:style>
+          <a:lnRef idx="2">
+            <a:schemeClr val="accent1">
+              <a:shade val="50000"/>
+            </a:schemeClr>
+          </a:lnRef>
+          <a:fillRef idx="1">
+            <a:schemeClr val="accent1"/>
+          </a:fillRef>
+          <a:effectRef idx="0">
+            <a:schemeClr val="accent1"/>
+          </a:effectRef>
+          <a:fontRef idx="minor">
+            <a:schemeClr val="lt1"/>
+          </a:fontRef>
+        </p:style>
+        <p:txBody>
+          <a:bodyPr rtlCol="0" anchor="ctr"/>
+          <a:lstStyle/>
+          <a:p>
+            <a:pPr algn="ctr"/>
+            <a:endParaRPr kumimoji="1" lang="ja-JP" altLang="en-US"/>
+          </a:p>
+        </p:txBody>
+      </p:sp>
+      <p:sp>
+        <p:nvSpPr>
+          <p:cNvPr id="8" name="四角形: 対角を切り取る 7">
+            <a:extLst>
+              <a:ext uri="{FF2B5EF4-FFF2-40B4-BE49-F238E27FC236}">
+                <a16:creationId xmlns:a16="http://schemas.microsoft.com/office/drawing/2014/main" id="{4F431F78-F624-42F4-93E3-DE06A8215993}"/>
+              </a:ext>
+            </a:extLst>
+          </p:cNvPr>
+          <p:cNvSpPr/>
+          <p:nvPr/>
+        </p:nvSpPr>
+        <p:spPr>
+          <a:xfrm rot="2700000">
+            <a:off x="8160059" y="3671085"/>
+            <a:ext cx="2343704" cy="2343704"/>
+          </a:xfrm>
+          <a:prstGeom prst="snip2DiagRect">
+            <a:avLst>
+              <a:gd name="adj1" fmla="val 50000"/>
+              <a:gd name="adj2" fmla="val 15267"/>
+            </a:avLst>
+          </a:prstGeom>
+          <a:gradFill>
+            <a:gsLst>
+              <a:gs pos="0">
+                <a:schemeClr val="accent1">
+                  <a:lumMod val="5000"/>
+                  <a:lumOff val="95000"/>
+                </a:schemeClr>
+              </a:gs>
+              <a:gs pos="40000">
+                <a:schemeClr val="tx1">
+                  <a:lumMod val="95000"/>
+                </a:schemeClr>
+              </a:gs>
+              <a:gs pos="62000">
+                <a:schemeClr val="tx1">
+                  <a:lumMod val="95000"/>
+                </a:schemeClr>
+              </a:gs>
+              <a:gs pos="95000">
+                <a:schemeClr val="tx1">
+                  <a:lumMod val="85000"/>
+                </a:schemeClr>
+              </a:gs>
+            </a:gsLst>
+            <a:lin ang="5400000" scaled="1"/>
+          </a:gradFill>
+          <a:ln>
+            <a:noFill/>
+          </a:ln>
+        </p:spPr>
+        <p:style>
+          <a:lnRef idx="2">
+            <a:schemeClr val="accent1">
+              <a:shade val="50000"/>
+            </a:schemeClr>
+          </a:lnRef>
+          <a:fillRef idx="1">
+            <a:schemeClr val="accent1"/>
+          </a:fillRef>
+          <a:effectRef idx="0">
+            <a:schemeClr val="accent1"/>
+          </a:effectRef>
+          <a:fontRef idx="minor">
+            <a:schemeClr val="lt1"/>
+          </a:fontRef>
+        </p:style>
+        <p:txBody>
+          <a:bodyPr rtlCol="0" anchor="ctr"/>
+          <a:lstStyle/>
+          <a:p>
+            <a:pPr algn="ctr"/>
+            <a:endParaRPr kumimoji="1" lang="ja-JP" altLang="en-US"/>
+          </a:p>
+        </p:txBody>
+      </p:sp>
+    </p:spTree>
+    <p:extLst>
+      <p:ext uri="{BB962C8B-B14F-4D97-AF65-F5344CB8AC3E}">
+        <p14:creationId xmlns:p14="http://schemas.microsoft.com/office/powerpoint/2010/main" val="2930997555"/>
+      </p:ext>
+    </p:extLst>
+  </p:cSld>
+  <p:clrMapOvr>
+    <a:masterClrMapping/>
+  </p:clrMapOvr>
+</p:sld>
+</file>
+
+<file path=ppt/slides/slide41.xml><?xml version="1.0" encoding="utf-8"?>
+<p:sld xmlns:a="http://schemas.openxmlformats.org/drawingml/2006/main" xmlns:r="http://schemas.openxmlformats.org/officeDocument/2006/relationships" xmlns:p="http://schemas.openxmlformats.org/presentationml/2006/main">
+  <p:cSld>
     <p:bg>
       <p:bgPr>
         <a:solidFill>
@@ -29464,7 +30066,7 @@
 </p:sld>
 </file>
 
-<file path=ppt/slides/slide41.xml><?xml version="1.0" encoding="utf-8"?>
+<file path=ppt/slides/slide42.xml><?xml version="1.0" encoding="utf-8"?>
 <p:sld xmlns:a="http://schemas.openxmlformats.org/drawingml/2006/main" xmlns:r="http://schemas.openxmlformats.org/officeDocument/2006/relationships" xmlns:p="http://schemas.openxmlformats.org/presentationml/2006/main">
   <p:cSld>
     <p:spTree>
@@ -29592,7 +30194,7 @@
 </p:sld>
 </file>
 
-<file path=ppt/slides/slide42.xml><?xml version="1.0" encoding="utf-8"?>
+<file path=ppt/slides/slide43.xml><?xml version="1.0" encoding="utf-8"?>
 <p:sld xmlns:a="http://schemas.openxmlformats.org/drawingml/2006/main" xmlns:r="http://schemas.openxmlformats.org/officeDocument/2006/relationships" xmlns:p="http://schemas.openxmlformats.org/presentationml/2006/main">
   <p:cSld>
     <p:spTree>
@@ -29836,7 +30438,7 @@
 </p:sld>
 </file>
 
-<file path=ppt/slides/slide43.xml><?xml version="1.0" encoding="utf-8"?>
+<file path=ppt/slides/slide44.xml><?xml version="1.0" encoding="utf-8"?>
 <p:sld xmlns:a="http://schemas.openxmlformats.org/drawingml/2006/main" xmlns:r="http://schemas.openxmlformats.org/officeDocument/2006/relationships" xmlns:p="http://schemas.openxmlformats.org/presentationml/2006/main">
   <p:cSld>
     <p:bg>
@@ -30299,7 +30901,7 @@
 </p:sld>
 </file>
 
-<file path=ppt/slides/slide44.xml><?xml version="1.0" encoding="utf-8"?>
+<file path=ppt/slides/slide45.xml><?xml version="1.0" encoding="utf-8"?>
 <p:sld xmlns:a="http://schemas.openxmlformats.org/drawingml/2006/main" xmlns:r="http://schemas.openxmlformats.org/officeDocument/2006/relationships" xmlns:p="http://schemas.openxmlformats.org/presentationml/2006/main">
   <p:cSld>
     <p:spTree>
@@ -30544,7 +31146,7 @@
 </p:sld>
 </file>
 
-<file path=ppt/slides/slide45.xml><?xml version="1.0" encoding="utf-8"?>
+<file path=ppt/slides/slide46.xml><?xml version="1.0" encoding="utf-8"?>
 <p:sld xmlns:a="http://schemas.openxmlformats.org/drawingml/2006/main" xmlns:r="http://schemas.openxmlformats.org/officeDocument/2006/relationships" xmlns:p="http://schemas.openxmlformats.org/presentationml/2006/main">
   <p:cSld>
     <p:spTree>
@@ -31179,7 +31781,7 @@
 </p:sld>
 </file>
 
-<file path=ppt/slides/slide46.xml><?xml version="1.0" encoding="utf-8"?>
+<file path=ppt/slides/slide47.xml><?xml version="1.0" encoding="utf-8"?>
 <p:sld xmlns:a="http://schemas.openxmlformats.org/drawingml/2006/main" xmlns:r="http://schemas.openxmlformats.org/officeDocument/2006/relationships" xmlns:p="http://schemas.openxmlformats.org/presentationml/2006/main">
   <p:cSld>
     <p:spTree>
@@ -31277,7 +31879,7 @@
 </p:sld>
 </file>
 
-<file path=ppt/slides/slide47.xml><?xml version="1.0" encoding="utf-8"?>
+<file path=ppt/slides/slide48.xml><?xml version="1.0" encoding="utf-8"?>
 <p:sld xmlns:a="http://schemas.openxmlformats.org/drawingml/2006/main" xmlns:r="http://schemas.openxmlformats.org/officeDocument/2006/relationships" xmlns:p="http://schemas.openxmlformats.org/presentationml/2006/main">
   <p:cSld>
     <p:spTree>
@@ -31457,7 +32059,7 @@
 </p:sld>
 </file>
 
-<file path=ppt/slides/slide48.xml><?xml version="1.0" encoding="utf-8"?>
+<file path=ppt/slides/slide49.xml><?xml version="1.0" encoding="utf-8"?>
 <p:sld xmlns:a="http://schemas.openxmlformats.org/drawingml/2006/main" xmlns:r="http://schemas.openxmlformats.org/officeDocument/2006/relationships" xmlns:p="http://schemas.openxmlformats.org/presentationml/2006/main">
   <p:cSld>
     <p:bg>
@@ -31842,7 +32444,308 @@
 </p:sld>
 </file>
 
-<file path=ppt/slides/slide49.xml><?xml version="1.0" encoding="utf-8"?>
+<file path=ppt/slides/slide5.xml><?xml version="1.0" encoding="utf-8"?>
+<p:sld xmlns:a="http://schemas.openxmlformats.org/drawingml/2006/main" xmlns:r="http://schemas.openxmlformats.org/officeDocument/2006/relationships" xmlns:p="http://schemas.openxmlformats.org/presentationml/2006/main">
+  <p:cSld>
+    <p:bg>
+      <p:bgPr>
+        <a:solidFill>
+          <a:schemeClr val="bg1"/>
+        </a:solidFill>
+        <a:effectLst/>
+      </p:bgPr>
+    </p:bg>
+    <p:spTree>
+      <p:nvGrpSpPr>
+        <p:cNvPr id="1" name=""/>
+        <p:cNvGrpSpPr/>
+        <p:nvPr/>
+      </p:nvGrpSpPr>
+      <p:grpSpPr>
+        <a:xfrm>
+          <a:off x="0" y="0"/>
+          <a:ext cx="0" cy="0"/>
+          <a:chOff x="0" y="0"/>
+          <a:chExt cx="0" cy="0"/>
+        </a:xfrm>
+      </p:grpSpPr>
+      <p:sp>
+        <p:nvSpPr>
+          <p:cNvPr id="2" name="正方形/長方形 1">
+            <a:extLst>
+              <a:ext uri="{FF2B5EF4-FFF2-40B4-BE49-F238E27FC236}">
+                <a16:creationId xmlns:a16="http://schemas.microsoft.com/office/drawing/2014/main" id="{4B1C241A-2084-45EF-8123-CD20D19CB66D}"/>
+              </a:ext>
+            </a:extLst>
+          </p:cNvPr>
+          <p:cNvSpPr/>
+          <p:nvPr/>
+        </p:nvSpPr>
+        <p:spPr>
+          <a:xfrm>
+            <a:off x="757561" y="229470"/>
+            <a:ext cx="6096000" cy="646331"/>
+          </a:xfrm>
+          <a:prstGeom prst="rect">
+            <a:avLst/>
+          </a:prstGeom>
+        </p:spPr>
+        <p:txBody>
+          <a:bodyPr>
+            <a:spAutoFit/>
+          </a:bodyPr>
+          <a:lstStyle/>
+          <a:p>
+            <a:br>
+              <a:rPr lang="en-US" altLang="ja-JP" dirty="0">
+                <a:solidFill>
+                  <a:srgbClr val="FF0000"/>
+                </a:solidFill>
+              </a:rPr>
+            </a:br>
+            <a:r>
+              <a:rPr lang="en-US" altLang="ja-JP" dirty="0">
+                <a:solidFill>
+                  <a:srgbClr val="FF0000"/>
+                </a:solidFill>
+                <a:latin typeface="arial" panose="020B0604020202020204" pitchFamily="34" charset="0"/>
+              </a:rPr>
+              <a:t>Arbeit</a:t>
+            </a:r>
+            <a:endParaRPr lang="ja-JP" altLang="en-US" dirty="0">
+              <a:solidFill>
+                <a:srgbClr val="FF0000"/>
+              </a:solidFill>
+            </a:endParaRPr>
+          </a:p>
+        </p:txBody>
+      </p:sp>
+      <p:sp>
+        <p:nvSpPr>
+          <p:cNvPr id="9" name="平行四辺形 8">
+            <a:extLst>
+              <a:ext uri="{FF2B5EF4-FFF2-40B4-BE49-F238E27FC236}">
+                <a16:creationId xmlns:a16="http://schemas.microsoft.com/office/drawing/2014/main" id="{AAB629A7-13D7-4122-BFA3-6A48EE21E4E4}"/>
+              </a:ext>
+            </a:extLst>
+          </p:cNvPr>
+          <p:cNvSpPr/>
+          <p:nvPr/>
+        </p:nvSpPr>
+        <p:spPr>
+          <a:xfrm>
+            <a:off x="2281315" y="2286000"/>
+            <a:ext cx="9910683" cy="2286000"/>
+          </a:xfrm>
+          <a:prstGeom prst="parallelogram">
+            <a:avLst>
+              <a:gd name="adj" fmla="val 99320"/>
+            </a:avLst>
+          </a:prstGeom>
+          <a:solidFill>
+            <a:schemeClr val="lt1"/>
+          </a:solidFill>
+          <a:ln>
+            <a:noFill/>
+          </a:ln>
+        </p:spPr>
+        <p:style>
+          <a:lnRef idx="2">
+            <a:schemeClr val="accent1">
+              <a:shade val="50000"/>
+            </a:schemeClr>
+          </a:lnRef>
+          <a:fillRef idx="1">
+            <a:schemeClr val="accent1"/>
+          </a:fillRef>
+          <a:effectRef idx="0">
+            <a:schemeClr val="accent1"/>
+          </a:effectRef>
+          <a:fontRef idx="minor">
+            <a:schemeClr val="lt1"/>
+          </a:fontRef>
+        </p:style>
+        <p:txBody>
+          <a:bodyPr rtlCol="0" anchor="ctr"/>
+          <a:lstStyle/>
+          <a:p>
+            <a:pPr algn="ctr"/>
+            <a:endParaRPr kumimoji="1" lang="ja-JP" altLang="en-US"/>
+          </a:p>
+        </p:txBody>
+      </p:sp>
+      <p:sp>
+        <p:nvSpPr>
+          <p:cNvPr id="8" name="正方形/長方形 7">
+            <a:extLst>
+              <a:ext uri="{FF2B5EF4-FFF2-40B4-BE49-F238E27FC236}">
+                <a16:creationId xmlns:a16="http://schemas.microsoft.com/office/drawing/2014/main" id="{79DDED25-7D51-4F41-AB7E-3ED58A24629A}"/>
+              </a:ext>
+            </a:extLst>
+          </p:cNvPr>
+          <p:cNvSpPr/>
+          <p:nvPr/>
+        </p:nvSpPr>
+        <p:spPr>
+          <a:xfrm flipH="1">
+            <a:off x="6853560" y="0"/>
+            <a:ext cx="5338438" cy="2286000"/>
+          </a:xfrm>
+          <a:prstGeom prst="rect">
+            <a:avLst/>
+          </a:prstGeom>
+          <a:solidFill>
+            <a:schemeClr val="tx1"/>
+          </a:solidFill>
+          <a:ln>
+            <a:noFill/>
+          </a:ln>
+        </p:spPr>
+        <p:style>
+          <a:lnRef idx="2">
+            <a:schemeClr val="accent1">
+              <a:shade val="50000"/>
+            </a:schemeClr>
+          </a:lnRef>
+          <a:fillRef idx="1">
+            <a:schemeClr val="accent1"/>
+          </a:fillRef>
+          <a:effectRef idx="0">
+            <a:schemeClr val="accent1"/>
+          </a:effectRef>
+          <a:fontRef idx="minor">
+            <a:schemeClr val="lt1"/>
+          </a:fontRef>
+        </p:style>
+        <p:txBody>
+          <a:bodyPr rtlCol="0" anchor="ctr"/>
+          <a:lstStyle/>
+          <a:p>
+            <a:pPr algn="ctr"/>
+            <a:endParaRPr kumimoji="1" lang="ja-JP" altLang="en-US"/>
+          </a:p>
+        </p:txBody>
+      </p:sp>
+      <p:sp>
+        <p:nvSpPr>
+          <p:cNvPr id="7" name="直角三角形 6">
+            <a:extLst>
+              <a:ext uri="{FF2B5EF4-FFF2-40B4-BE49-F238E27FC236}">
+                <a16:creationId xmlns:a16="http://schemas.microsoft.com/office/drawing/2014/main" id="{E21BAC9A-31DC-46CE-8B66-6CA21B4D7BFC}"/>
+              </a:ext>
+            </a:extLst>
+          </p:cNvPr>
+          <p:cNvSpPr/>
+          <p:nvPr/>
+        </p:nvSpPr>
+        <p:spPr>
+          <a:xfrm flipH="1">
+            <a:off x="4548849" y="1"/>
+            <a:ext cx="2304711" cy="2286000"/>
+          </a:xfrm>
+          <a:prstGeom prst="rtTriangle">
+            <a:avLst/>
+          </a:prstGeom>
+          <a:solidFill>
+            <a:schemeClr val="tx1"/>
+          </a:solidFill>
+          <a:ln>
+            <a:noFill/>
+          </a:ln>
+        </p:spPr>
+        <p:style>
+          <a:lnRef idx="2">
+            <a:schemeClr val="accent1">
+              <a:shade val="50000"/>
+            </a:schemeClr>
+          </a:lnRef>
+          <a:fillRef idx="1">
+            <a:schemeClr val="accent1"/>
+          </a:fillRef>
+          <a:effectRef idx="0">
+            <a:schemeClr val="accent1"/>
+          </a:effectRef>
+          <a:fontRef idx="minor">
+            <a:schemeClr val="lt1"/>
+          </a:fontRef>
+        </p:style>
+        <p:txBody>
+          <a:bodyPr rtlCol="0" anchor="ctr"/>
+          <a:lstStyle/>
+          <a:p>
+            <a:pPr algn="ctr"/>
+            <a:endParaRPr kumimoji="1" lang="ja-JP" altLang="en-US"/>
+          </a:p>
+        </p:txBody>
+      </p:sp>
+      <p:sp>
+        <p:nvSpPr>
+          <p:cNvPr id="10" name="平行四辺形 9">
+            <a:extLst>
+              <a:ext uri="{FF2B5EF4-FFF2-40B4-BE49-F238E27FC236}">
+                <a16:creationId xmlns:a16="http://schemas.microsoft.com/office/drawing/2014/main" id="{A03720F5-9ACC-40EF-899B-13D2D5F910DF}"/>
+              </a:ext>
+            </a:extLst>
+          </p:cNvPr>
+          <p:cNvSpPr/>
+          <p:nvPr/>
+        </p:nvSpPr>
+        <p:spPr>
+          <a:xfrm>
+            <a:off x="0" y="4572000"/>
+            <a:ext cx="9910683" cy="2286000"/>
+          </a:xfrm>
+          <a:prstGeom prst="parallelogram">
+            <a:avLst>
+              <a:gd name="adj" fmla="val 99320"/>
+            </a:avLst>
+          </a:prstGeom>
+          <a:solidFill>
+            <a:schemeClr val="lt1"/>
+          </a:solidFill>
+          <a:ln>
+            <a:noFill/>
+          </a:ln>
+        </p:spPr>
+        <p:style>
+          <a:lnRef idx="2">
+            <a:schemeClr val="accent1">
+              <a:shade val="50000"/>
+            </a:schemeClr>
+          </a:lnRef>
+          <a:fillRef idx="1">
+            <a:schemeClr val="accent1"/>
+          </a:fillRef>
+          <a:effectRef idx="0">
+            <a:schemeClr val="accent1"/>
+          </a:effectRef>
+          <a:fontRef idx="minor">
+            <a:schemeClr val="lt1"/>
+          </a:fontRef>
+        </p:style>
+        <p:txBody>
+          <a:bodyPr rtlCol="0" anchor="ctr"/>
+          <a:lstStyle/>
+          <a:p>
+            <a:pPr algn="ctr"/>
+            <a:endParaRPr kumimoji="1" lang="ja-JP" altLang="en-US"/>
+          </a:p>
+        </p:txBody>
+      </p:sp>
+    </p:spTree>
+    <p:extLst>
+      <p:ext uri="{BB962C8B-B14F-4D97-AF65-F5344CB8AC3E}">
+        <p14:creationId xmlns:p14="http://schemas.microsoft.com/office/powerpoint/2010/main" val="1915476024"/>
+      </p:ext>
+    </p:extLst>
+  </p:cSld>
+  <p:clrMapOvr>
+    <a:masterClrMapping/>
+  </p:clrMapOvr>
+</p:sld>
+</file>
+
+<file path=ppt/slides/slide50.xml><?xml version="1.0" encoding="utf-8"?>
 <p:sld xmlns:a="http://schemas.openxmlformats.org/drawingml/2006/main" xmlns:r="http://schemas.openxmlformats.org/officeDocument/2006/relationships" xmlns:p="http://schemas.openxmlformats.org/presentationml/2006/main">
   <p:cSld>
     <p:bg>
@@ -32581,308 +33484,7 @@
 </p:sld>
 </file>
 
-<file path=ppt/slides/slide5.xml><?xml version="1.0" encoding="utf-8"?>
-<p:sld xmlns:a="http://schemas.openxmlformats.org/drawingml/2006/main" xmlns:r="http://schemas.openxmlformats.org/officeDocument/2006/relationships" xmlns:p="http://schemas.openxmlformats.org/presentationml/2006/main">
-  <p:cSld>
-    <p:bg>
-      <p:bgPr>
-        <a:solidFill>
-          <a:schemeClr val="bg1"/>
-        </a:solidFill>
-        <a:effectLst/>
-      </p:bgPr>
-    </p:bg>
-    <p:spTree>
-      <p:nvGrpSpPr>
-        <p:cNvPr id="1" name=""/>
-        <p:cNvGrpSpPr/>
-        <p:nvPr/>
-      </p:nvGrpSpPr>
-      <p:grpSpPr>
-        <a:xfrm>
-          <a:off x="0" y="0"/>
-          <a:ext cx="0" cy="0"/>
-          <a:chOff x="0" y="0"/>
-          <a:chExt cx="0" cy="0"/>
-        </a:xfrm>
-      </p:grpSpPr>
-      <p:sp>
-        <p:nvSpPr>
-          <p:cNvPr id="2" name="正方形/長方形 1">
-            <a:extLst>
-              <a:ext uri="{FF2B5EF4-FFF2-40B4-BE49-F238E27FC236}">
-                <a16:creationId xmlns:a16="http://schemas.microsoft.com/office/drawing/2014/main" id="{4B1C241A-2084-45EF-8123-CD20D19CB66D}"/>
-              </a:ext>
-            </a:extLst>
-          </p:cNvPr>
-          <p:cNvSpPr/>
-          <p:nvPr/>
-        </p:nvSpPr>
-        <p:spPr>
-          <a:xfrm>
-            <a:off x="757561" y="229470"/>
-            <a:ext cx="6096000" cy="646331"/>
-          </a:xfrm>
-          <a:prstGeom prst="rect">
-            <a:avLst/>
-          </a:prstGeom>
-        </p:spPr>
-        <p:txBody>
-          <a:bodyPr>
-            <a:spAutoFit/>
-          </a:bodyPr>
-          <a:lstStyle/>
-          <a:p>
-            <a:br>
-              <a:rPr lang="en-US" altLang="ja-JP" dirty="0">
-                <a:solidFill>
-                  <a:srgbClr val="FF0000"/>
-                </a:solidFill>
-              </a:rPr>
-            </a:br>
-            <a:r>
-              <a:rPr lang="en-US" altLang="ja-JP" dirty="0">
-                <a:solidFill>
-                  <a:srgbClr val="FF0000"/>
-                </a:solidFill>
-                <a:latin typeface="arial" panose="020B0604020202020204" pitchFamily="34" charset="0"/>
-              </a:rPr>
-              <a:t>Arbeit</a:t>
-            </a:r>
-            <a:endParaRPr lang="ja-JP" altLang="en-US" dirty="0">
-              <a:solidFill>
-                <a:srgbClr val="FF0000"/>
-              </a:solidFill>
-            </a:endParaRPr>
-          </a:p>
-        </p:txBody>
-      </p:sp>
-      <p:sp>
-        <p:nvSpPr>
-          <p:cNvPr id="9" name="平行四辺形 8">
-            <a:extLst>
-              <a:ext uri="{FF2B5EF4-FFF2-40B4-BE49-F238E27FC236}">
-                <a16:creationId xmlns:a16="http://schemas.microsoft.com/office/drawing/2014/main" id="{AAB629A7-13D7-4122-BFA3-6A48EE21E4E4}"/>
-              </a:ext>
-            </a:extLst>
-          </p:cNvPr>
-          <p:cNvSpPr/>
-          <p:nvPr/>
-        </p:nvSpPr>
-        <p:spPr>
-          <a:xfrm>
-            <a:off x="2281315" y="2286000"/>
-            <a:ext cx="9910683" cy="2286000"/>
-          </a:xfrm>
-          <a:prstGeom prst="parallelogram">
-            <a:avLst>
-              <a:gd name="adj" fmla="val 99320"/>
-            </a:avLst>
-          </a:prstGeom>
-          <a:solidFill>
-            <a:schemeClr val="lt1"/>
-          </a:solidFill>
-          <a:ln>
-            <a:noFill/>
-          </a:ln>
-        </p:spPr>
-        <p:style>
-          <a:lnRef idx="2">
-            <a:schemeClr val="accent1">
-              <a:shade val="50000"/>
-            </a:schemeClr>
-          </a:lnRef>
-          <a:fillRef idx="1">
-            <a:schemeClr val="accent1"/>
-          </a:fillRef>
-          <a:effectRef idx="0">
-            <a:schemeClr val="accent1"/>
-          </a:effectRef>
-          <a:fontRef idx="minor">
-            <a:schemeClr val="lt1"/>
-          </a:fontRef>
-        </p:style>
-        <p:txBody>
-          <a:bodyPr rtlCol="0" anchor="ctr"/>
-          <a:lstStyle/>
-          <a:p>
-            <a:pPr algn="ctr"/>
-            <a:endParaRPr kumimoji="1" lang="ja-JP" altLang="en-US"/>
-          </a:p>
-        </p:txBody>
-      </p:sp>
-      <p:sp>
-        <p:nvSpPr>
-          <p:cNvPr id="8" name="正方形/長方形 7">
-            <a:extLst>
-              <a:ext uri="{FF2B5EF4-FFF2-40B4-BE49-F238E27FC236}">
-                <a16:creationId xmlns:a16="http://schemas.microsoft.com/office/drawing/2014/main" id="{79DDED25-7D51-4F41-AB7E-3ED58A24629A}"/>
-              </a:ext>
-            </a:extLst>
-          </p:cNvPr>
-          <p:cNvSpPr/>
-          <p:nvPr/>
-        </p:nvSpPr>
-        <p:spPr>
-          <a:xfrm flipH="1">
-            <a:off x="6853560" y="0"/>
-            <a:ext cx="5338438" cy="2286000"/>
-          </a:xfrm>
-          <a:prstGeom prst="rect">
-            <a:avLst/>
-          </a:prstGeom>
-          <a:solidFill>
-            <a:schemeClr val="tx1"/>
-          </a:solidFill>
-          <a:ln>
-            <a:noFill/>
-          </a:ln>
-        </p:spPr>
-        <p:style>
-          <a:lnRef idx="2">
-            <a:schemeClr val="accent1">
-              <a:shade val="50000"/>
-            </a:schemeClr>
-          </a:lnRef>
-          <a:fillRef idx="1">
-            <a:schemeClr val="accent1"/>
-          </a:fillRef>
-          <a:effectRef idx="0">
-            <a:schemeClr val="accent1"/>
-          </a:effectRef>
-          <a:fontRef idx="minor">
-            <a:schemeClr val="lt1"/>
-          </a:fontRef>
-        </p:style>
-        <p:txBody>
-          <a:bodyPr rtlCol="0" anchor="ctr"/>
-          <a:lstStyle/>
-          <a:p>
-            <a:pPr algn="ctr"/>
-            <a:endParaRPr kumimoji="1" lang="ja-JP" altLang="en-US"/>
-          </a:p>
-        </p:txBody>
-      </p:sp>
-      <p:sp>
-        <p:nvSpPr>
-          <p:cNvPr id="7" name="直角三角形 6">
-            <a:extLst>
-              <a:ext uri="{FF2B5EF4-FFF2-40B4-BE49-F238E27FC236}">
-                <a16:creationId xmlns:a16="http://schemas.microsoft.com/office/drawing/2014/main" id="{E21BAC9A-31DC-46CE-8B66-6CA21B4D7BFC}"/>
-              </a:ext>
-            </a:extLst>
-          </p:cNvPr>
-          <p:cNvSpPr/>
-          <p:nvPr/>
-        </p:nvSpPr>
-        <p:spPr>
-          <a:xfrm flipH="1">
-            <a:off x="4548849" y="1"/>
-            <a:ext cx="2304711" cy="2286000"/>
-          </a:xfrm>
-          <a:prstGeom prst="rtTriangle">
-            <a:avLst/>
-          </a:prstGeom>
-          <a:solidFill>
-            <a:schemeClr val="tx1"/>
-          </a:solidFill>
-          <a:ln>
-            <a:noFill/>
-          </a:ln>
-        </p:spPr>
-        <p:style>
-          <a:lnRef idx="2">
-            <a:schemeClr val="accent1">
-              <a:shade val="50000"/>
-            </a:schemeClr>
-          </a:lnRef>
-          <a:fillRef idx="1">
-            <a:schemeClr val="accent1"/>
-          </a:fillRef>
-          <a:effectRef idx="0">
-            <a:schemeClr val="accent1"/>
-          </a:effectRef>
-          <a:fontRef idx="minor">
-            <a:schemeClr val="lt1"/>
-          </a:fontRef>
-        </p:style>
-        <p:txBody>
-          <a:bodyPr rtlCol="0" anchor="ctr"/>
-          <a:lstStyle/>
-          <a:p>
-            <a:pPr algn="ctr"/>
-            <a:endParaRPr kumimoji="1" lang="ja-JP" altLang="en-US"/>
-          </a:p>
-        </p:txBody>
-      </p:sp>
-      <p:sp>
-        <p:nvSpPr>
-          <p:cNvPr id="10" name="平行四辺形 9">
-            <a:extLst>
-              <a:ext uri="{FF2B5EF4-FFF2-40B4-BE49-F238E27FC236}">
-                <a16:creationId xmlns:a16="http://schemas.microsoft.com/office/drawing/2014/main" id="{A03720F5-9ACC-40EF-899B-13D2D5F910DF}"/>
-              </a:ext>
-            </a:extLst>
-          </p:cNvPr>
-          <p:cNvSpPr/>
-          <p:nvPr/>
-        </p:nvSpPr>
-        <p:spPr>
-          <a:xfrm>
-            <a:off x="0" y="4572000"/>
-            <a:ext cx="9910683" cy="2286000"/>
-          </a:xfrm>
-          <a:prstGeom prst="parallelogram">
-            <a:avLst>
-              <a:gd name="adj" fmla="val 99320"/>
-            </a:avLst>
-          </a:prstGeom>
-          <a:solidFill>
-            <a:schemeClr val="lt1"/>
-          </a:solidFill>
-          <a:ln>
-            <a:noFill/>
-          </a:ln>
-        </p:spPr>
-        <p:style>
-          <a:lnRef idx="2">
-            <a:schemeClr val="accent1">
-              <a:shade val="50000"/>
-            </a:schemeClr>
-          </a:lnRef>
-          <a:fillRef idx="1">
-            <a:schemeClr val="accent1"/>
-          </a:fillRef>
-          <a:effectRef idx="0">
-            <a:schemeClr val="accent1"/>
-          </a:effectRef>
-          <a:fontRef idx="minor">
-            <a:schemeClr val="lt1"/>
-          </a:fontRef>
-        </p:style>
-        <p:txBody>
-          <a:bodyPr rtlCol="0" anchor="ctr"/>
-          <a:lstStyle/>
-          <a:p>
-            <a:pPr algn="ctr"/>
-            <a:endParaRPr kumimoji="1" lang="ja-JP" altLang="en-US"/>
-          </a:p>
-        </p:txBody>
-      </p:sp>
-    </p:spTree>
-    <p:extLst>
-      <p:ext uri="{BB962C8B-B14F-4D97-AF65-F5344CB8AC3E}">
-        <p14:creationId xmlns:p14="http://schemas.microsoft.com/office/powerpoint/2010/main" val="1915476024"/>
-      </p:ext>
-    </p:extLst>
-  </p:cSld>
-  <p:clrMapOvr>
-    <a:masterClrMapping/>
-  </p:clrMapOvr>
-</p:sld>
-</file>
-
-<file path=ppt/slides/slide50.xml><?xml version="1.0" encoding="utf-8"?>
+<file path=ppt/slides/slide51.xml><?xml version="1.0" encoding="utf-8"?>
 <p:sld xmlns:a="http://schemas.openxmlformats.org/drawingml/2006/main" xmlns:r="http://schemas.openxmlformats.org/officeDocument/2006/relationships" xmlns:p="http://schemas.openxmlformats.org/presentationml/2006/main">
   <p:cSld>
     <p:bg>
@@ -33374,7 +33976,7 @@
 </p:sld>
 </file>
 
-<file path=ppt/slides/slide51.xml><?xml version="1.0" encoding="utf-8"?>
+<file path=ppt/slides/slide52.xml><?xml version="1.0" encoding="utf-8"?>
 <p:sld xmlns:a="http://schemas.openxmlformats.org/drawingml/2006/main" xmlns:r="http://schemas.openxmlformats.org/officeDocument/2006/relationships" xmlns:p="http://schemas.openxmlformats.org/presentationml/2006/main">
   <p:cSld>
     <p:bg>
@@ -34019,7 +34621,7 @@
 </p:sld>
 </file>
 
-<file path=ppt/slides/slide52.xml><?xml version="1.0" encoding="utf-8"?>
+<file path=ppt/slides/slide53.xml><?xml version="1.0" encoding="utf-8"?>
 <p:sld xmlns:a="http://schemas.openxmlformats.org/drawingml/2006/main" xmlns:r="http://schemas.openxmlformats.org/officeDocument/2006/relationships" xmlns:p="http://schemas.openxmlformats.org/presentationml/2006/main">
   <p:cSld>
     <p:spTree>
@@ -34460,7 +35062,7 @@
 </p:sld>
 </file>
 
-<file path=ppt/slides/slide53.xml><?xml version="1.0" encoding="utf-8"?>
+<file path=ppt/slides/slide54.xml><?xml version="1.0" encoding="utf-8"?>
 <p:sld xmlns:a="http://schemas.openxmlformats.org/drawingml/2006/main" xmlns:r="http://schemas.openxmlformats.org/officeDocument/2006/relationships" xmlns:p="http://schemas.openxmlformats.org/presentationml/2006/main">
   <p:cSld>
     <p:spTree>
@@ -36394,7 +36996,7 @@
 </p:sld>
 </file>
 
-<file path=ppt/slides/slide54.xml><?xml version="1.0" encoding="utf-8"?>
+<file path=ppt/slides/slide55.xml><?xml version="1.0" encoding="utf-8"?>
 <p:sld xmlns:a="http://schemas.openxmlformats.org/drawingml/2006/main" xmlns:r="http://schemas.openxmlformats.org/officeDocument/2006/relationships" xmlns:p="http://schemas.openxmlformats.org/presentationml/2006/main">
   <p:cSld>
     <p:spTree>
@@ -36856,7 +37458,7 @@
 </p:sld>
 </file>
 
-<file path=ppt/slides/slide55.xml><?xml version="1.0" encoding="utf-8"?>
+<file path=ppt/slides/slide56.xml><?xml version="1.0" encoding="utf-8"?>
 <p:sld xmlns:a="http://schemas.openxmlformats.org/drawingml/2006/main" xmlns:r="http://schemas.openxmlformats.org/officeDocument/2006/relationships" xmlns:p="http://schemas.openxmlformats.org/presentationml/2006/main">
   <p:cSld>
     <p:spTree>
@@ -37002,7 +37604,7 @@
 </p:sld>
 </file>
 
-<file path=ppt/slides/slide56.xml><?xml version="1.0" encoding="utf-8"?>
+<file path=ppt/slides/slide57.xml><?xml version="1.0" encoding="utf-8"?>
 <p:sld xmlns:a="http://schemas.openxmlformats.org/drawingml/2006/main" xmlns:r="http://schemas.openxmlformats.org/officeDocument/2006/relationships" xmlns:p="http://schemas.openxmlformats.org/presentationml/2006/main">
   <p:cSld>
     <p:spTree>
@@ -37102,7 +37704,7 @@
 </p:sld>
 </file>
 
-<file path=ppt/slides/slide57.xml><?xml version="1.0" encoding="utf-8"?>
+<file path=ppt/slides/slide58.xml><?xml version="1.0" encoding="utf-8"?>
 <p:sld xmlns:a="http://schemas.openxmlformats.org/drawingml/2006/main" xmlns:r="http://schemas.openxmlformats.org/officeDocument/2006/relationships" xmlns:p="http://schemas.openxmlformats.org/presentationml/2006/main">
   <p:cSld>
     <p:bg>
@@ -37423,7 +38025,7 @@
 </p:sld>
 </file>
 
-<file path=ppt/slides/slide58.xml><?xml version="1.0" encoding="utf-8"?>
+<file path=ppt/slides/slide59.xml><?xml version="1.0" encoding="utf-8"?>
 <p:sld xmlns:a="http://schemas.openxmlformats.org/drawingml/2006/main" xmlns:r="http://schemas.openxmlformats.org/officeDocument/2006/relationships" xmlns:p="http://schemas.openxmlformats.org/presentationml/2006/main">
   <p:cSld>
     <p:spTree>

</xml_diff>